<commit_message>
Added pictures for Mark and Torsten
</commit_message>
<xml_diff>
--- a/soaring-through-the-clouds-ofmw-forum2016-valencia-demo.pptx
+++ b/soaring-through-the-clouds-ofmw-forum2016-valencia-demo.pptx
@@ -7142,7 +7142,7 @@
         </p:blipFill>
         <p:spPr bwMode="auto">
           <a:xfrm>
-            <a:off x="2879812" y="3955475"/>
+            <a:off x="5724128" y="4746992"/>
             <a:ext cx="1080120" cy="1599090"/>
           </a:xfrm>
           <a:prstGeom prst="rect">
@@ -7185,6 +7185,86 @@
           <a:xfrm>
             <a:off x="3995936" y="4365104"/>
             <a:ext cx="1517915" cy="2276872"/>
+          </a:xfrm>
+          <a:prstGeom prst="rect">
+            <a:avLst/>
+          </a:prstGeom>
+          <a:noFill/>
+          <a:extLst>
+            <a:ext uri="{909E8E84-426E-40DD-AFC4-6F175D3DCCD1}">
+              <a14:hiddenFill xmlns:a14="http://schemas.microsoft.com/office/drawing/2010/main">
+                <a:solidFill>
+                  <a:srgbClr val="FFFFFF"/>
+                </a:solidFill>
+              </a14:hiddenFill>
+            </a:ext>
+          </a:extLst>
+        </p:spPr>
+      </p:pic>
+      <p:pic>
+        <p:nvPicPr>
+          <p:cNvPr id="5" name="Picture 2" descr="Torsten Winterberg"/>
+          <p:cNvPicPr>
+            <a:picLocks noChangeAspect="1" noChangeArrowheads="1"/>
+          </p:cNvPicPr>
+          <p:nvPr/>
+        </p:nvPicPr>
+        <p:blipFill>
+          <a:blip r:embed="rId5">
+            <a:extLst>
+              <a:ext uri="{28A0092B-C50C-407E-A947-70E740481C1C}">
+                <a14:useLocalDpi xmlns:a14="http://schemas.microsoft.com/office/drawing/2010/main" val="0"/>
+              </a:ext>
+            </a:extLst>
+          </a:blip>
+          <a:srcRect/>
+          <a:stretch>
+            <a:fillRect/>
+          </a:stretch>
+        </p:blipFill>
+        <p:spPr bwMode="auto">
+          <a:xfrm>
+            <a:off x="7052810" y="4077071"/>
+            <a:ext cx="1656437" cy="1656437"/>
+          </a:xfrm>
+          <a:prstGeom prst="rect">
+            <a:avLst/>
+          </a:prstGeom>
+          <a:noFill/>
+          <a:extLst>
+            <a:ext uri="{909E8E84-426E-40DD-AFC4-6F175D3DCCD1}">
+              <a14:hiddenFill xmlns:a14="http://schemas.microsoft.com/office/drawing/2010/main">
+                <a:solidFill>
+                  <a:srgbClr val="FFFFFF"/>
+                </a:solidFill>
+              </a14:hiddenFill>
+            </a:ext>
+          </a:extLst>
+        </p:spPr>
+      </p:pic>
+      <p:pic>
+        <p:nvPicPr>
+          <p:cNvPr id="1028" name="Picture 4" descr="Mark Simpson"/>
+          <p:cNvPicPr>
+            <a:picLocks noChangeAspect="1" noChangeArrowheads="1"/>
+          </p:cNvPicPr>
+          <p:nvPr/>
+        </p:nvPicPr>
+        <p:blipFill rotWithShape="1">
+          <a:blip r:embed="rId6">
+            <a:extLst>
+              <a:ext uri="{28A0092B-C50C-407E-A947-70E740481C1C}">
+                <a14:useLocalDpi xmlns:a14="http://schemas.microsoft.com/office/drawing/2010/main" val="0"/>
+              </a:ext>
+            </a:extLst>
+          </a:blip>
+          <a:srcRect l="11629" r="11661"/>
+          <a:stretch/>
+        </p:blipFill>
+        <p:spPr bwMode="auto">
+          <a:xfrm>
+            <a:off x="2627784" y="3828508"/>
+            <a:ext cx="1461330" cy="1905000"/>
           </a:xfrm>
           <a:prstGeom prst="rect">
             <a:avLst/>

</xml_diff>

<commit_message>
Added Mark's slide on PCS/Doc CS, Sites CS and OSN
</commit_message>
<xml_diff>
--- a/soaring-through-the-clouds-ofmw-forum2016-valencia-demo.pptx
+++ b/soaring-through-the-clouds-ofmw-forum2016-valencia-demo.pptx
@@ -16,6 +16,7 @@
     <p:sldId id="271" r:id="rId10"/>
     <p:sldId id="272" r:id="rId11"/>
     <p:sldId id="263" r:id="rId12"/>
+    <p:sldId id="273" r:id="rId13"/>
   </p:sldIdLst>
   <p:sldSz cx="9144000" cy="6858000" type="screen4x3"/>
   <p:notesSz cx="6858000" cy="9144000"/>
@@ -298,7 +299,7 @@
           <a:p>
             <a:fld id="{8A80D3F4-BE92-40ED-BB36-22F03F9BF743}" type="datetimeFigureOut">
               <a:rPr lang="en-US" smtClean="0"/>
-              <a:t>3/15/2016</a:t>
+              <a:t>3/16/2016</a:t>
             </a:fld>
             <a:endParaRPr lang="en-US"/>
           </a:p>
@@ -468,7 +469,7 @@
           <a:p>
             <a:fld id="{8A80D3F4-BE92-40ED-BB36-22F03F9BF743}" type="datetimeFigureOut">
               <a:rPr lang="en-US" smtClean="0"/>
-              <a:t>3/15/2016</a:t>
+              <a:t>3/16/2016</a:t>
             </a:fld>
             <a:endParaRPr lang="en-US"/>
           </a:p>
@@ -648,7 +649,7 @@
           <a:p>
             <a:fld id="{8A80D3F4-BE92-40ED-BB36-22F03F9BF743}" type="datetimeFigureOut">
               <a:rPr lang="en-US" smtClean="0"/>
-              <a:t>3/15/2016</a:t>
+              <a:t>3/16/2016</a:t>
             </a:fld>
             <a:endParaRPr lang="en-US"/>
           </a:p>
@@ -818,7 +819,7 @@
           <a:p>
             <a:fld id="{8A80D3F4-BE92-40ED-BB36-22F03F9BF743}" type="datetimeFigureOut">
               <a:rPr lang="en-US" smtClean="0"/>
-              <a:t>3/15/2016</a:t>
+              <a:t>3/16/2016</a:t>
             </a:fld>
             <a:endParaRPr lang="en-US"/>
           </a:p>
@@ -1064,7 +1065,7 @@
           <a:p>
             <a:fld id="{8A80D3F4-BE92-40ED-BB36-22F03F9BF743}" type="datetimeFigureOut">
               <a:rPr lang="en-US" smtClean="0"/>
-              <a:t>3/15/2016</a:t>
+              <a:t>3/16/2016</a:t>
             </a:fld>
             <a:endParaRPr lang="en-US"/>
           </a:p>
@@ -1352,7 +1353,7 @@
           <a:p>
             <a:fld id="{8A80D3F4-BE92-40ED-BB36-22F03F9BF743}" type="datetimeFigureOut">
               <a:rPr lang="en-US" smtClean="0"/>
-              <a:t>3/15/2016</a:t>
+              <a:t>3/16/2016</a:t>
             </a:fld>
             <a:endParaRPr lang="en-US"/>
           </a:p>
@@ -1774,7 +1775,7 @@
           <a:p>
             <a:fld id="{8A80D3F4-BE92-40ED-BB36-22F03F9BF743}" type="datetimeFigureOut">
               <a:rPr lang="en-US" smtClean="0"/>
-              <a:t>3/15/2016</a:t>
+              <a:t>3/16/2016</a:t>
             </a:fld>
             <a:endParaRPr lang="en-US"/>
           </a:p>
@@ -1892,7 +1893,7 @@
           <a:p>
             <a:fld id="{8A80D3F4-BE92-40ED-BB36-22F03F9BF743}" type="datetimeFigureOut">
               <a:rPr lang="en-US" smtClean="0"/>
-              <a:t>3/15/2016</a:t>
+              <a:t>3/16/2016</a:t>
             </a:fld>
             <a:endParaRPr lang="en-US"/>
           </a:p>
@@ -1987,7 +1988,7 @@
           <a:p>
             <a:fld id="{8A80D3F4-BE92-40ED-BB36-22F03F9BF743}" type="datetimeFigureOut">
               <a:rPr lang="en-US" smtClean="0"/>
-              <a:t>3/15/2016</a:t>
+              <a:t>3/16/2016</a:t>
             </a:fld>
             <a:endParaRPr lang="en-US"/>
           </a:p>
@@ -2264,7 +2265,7 @@
           <a:p>
             <a:fld id="{8A80D3F4-BE92-40ED-BB36-22F03F9BF743}" type="datetimeFigureOut">
               <a:rPr lang="en-US" smtClean="0"/>
-              <a:t>3/15/2016</a:t>
+              <a:t>3/16/2016</a:t>
             </a:fld>
             <a:endParaRPr lang="en-US"/>
           </a:p>
@@ -2517,7 +2518,7 @@
           <a:p>
             <a:fld id="{8A80D3F4-BE92-40ED-BB36-22F03F9BF743}" type="datetimeFigureOut">
               <a:rPr lang="en-US" smtClean="0"/>
-              <a:t>3/15/2016</a:t>
+              <a:t>3/16/2016</a:t>
             </a:fld>
             <a:endParaRPr lang="en-US"/>
           </a:p>
@@ -2730,7 +2731,7 @@
           <a:p>
             <a:fld id="{8A80D3F4-BE92-40ED-BB36-22F03F9BF743}" type="datetimeFigureOut">
               <a:rPr lang="en-US" smtClean="0"/>
-              <a:t>3/15/2016</a:t>
+              <a:t>3/16/2016</a:t>
             </a:fld>
             <a:endParaRPr lang="en-US"/>
           </a:p>
@@ -5938,6 +5939,948 @@
     <p:extLst>
       <p:ext uri="{BB962C8B-B14F-4D97-AF65-F5344CB8AC3E}">
         <p14:creationId xmlns:p14="http://schemas.microsoft.com/office/powerpoint/2010/main" val="2748570154"/>
+      </p:ext>
+    </p:extLst>
+  </p:cSld>
+  <p:clrMapOvr>
+    <a:masterClrMapping/>
+  </p:clrMapOvr>
+  <p:timing>
+    <p:tnLst>
+      <p:par>
+        <p:cTn id="1" dur="indefinite" restart="never" nodeType="tmRoot"/>
+      </p:par>
+    </p:tnLst>
+  </p:timing>
+</p:sld>
+</file>
+
+<file path=ppt/slides/slide12.xml><?xml version="1.0" encoding="utf-8"?>
+<p:sld xmlns:a="http://schemas.openxmlformats.org/drawingml/2006/main" xmlns:r="http://schemas.openxmlformats.org/officeDocument/2006/relationships" xmlns:p="http://schemas.openxmlformats.org/presentationml/2006/main">
+  <p:cSld>
+    <p:spTree>
+      <p:nvGrpSpPr>
+        <p:cNvPr id="1" name=""/>
+        <p:cNvGrpSpPr/>
+        <p:nvPr/>
+      </p:nvGrpSpPr>
+      <p:grpSpPr>
+        <a:xfrm>
+          <a:off x="0" y="0"/>
+          <a:ext cx="0" cy="0"/>
+          <a:chOff x="0" y="0"/>
+          <a:chExt cx="0" cy="0"/>
+        </a:xfrm>
+      </p:grpSpPr>
+      <p:pic>
+        <p:nvPicPr>
+          <p:cNvPr id="23" name="Picture 22"/>
+          <p:cNvPicPr>
+            <a:picLocks noChangeAspect="1"/>
+          </p:cNvPicPr>
+          <p:nvPr/>
+        </p:nvPicPr>
+        <p:blipFill>
+          <a:blip r:embed="rId2"/>
+          <a:stretch>
+            <a:fillRect/>
+          </a:stretch>
+        </p:blipFill>
+        <p:spPr>
+          <a:xfrm>
+            <a:off x="732512" y="3795573"/>
+            <a:ext cx="2013658" cy="1740281"/>
+          </a:xfrm>
+          <a:prstGeom prst="rect">
+            <a:avLst/>
+          </a:prstGeom>
+          <a:ln>
+            <a:gradFill>
+              <a:gsLst>
+                <a:gs pos="0">
+                  <a:schemeClr val="accent1">
+                    <a:lumMod val="5000"/>
+                    <a:lumOff val="95000"/>
+                  </a:schemeClr>
+                </a:gs>
+                <a:gs pos="74000">
+                  <a:schemeClr val="accent1">
+                    <a:lumMod val="45000"/>
+                    <a:lumOff val="55000"/>
+                  </a:schemeClr>
+                </a:gs>
+                <a:gs pos="83000">
+                  <a:schemeClr val="accent1">
+                    <a:lumMod val="45000"/>
+                    <a:lumOff val="55000"/>
+                  </a:schemeClr>
+                </a:gs>
+                <a:gs pos="100000">
+                  <a:schemeClr val="accent1">
+                    <a:lumMod val="30000"/>
+                    <a:lumOff val="70000"/>
+                  </a:schemeClr>
+                </a:gs>
+              </a:gsLst>
+              <a:lin ang="5400000" scaled="1"/>
+            </a:gradFill>
+          </a:ln>
+        </p:spPr>
+      </p:pic>
+      <p:pic>
+        <p:nvPicPr>
+          <p:cNvPr id="22" name="Picture 21"/>
+          <p:cNvPicPr>
+            <a:picLocks noChangeAspect="1"/>
+          </p:cNvPicPr>
+          <p:nvPr/>
+        </p:nvPicPr>
+        <p:blipFill>
+          <a:blip r:embed="rId3"/>
+          <a:stretch>
+            <a:fillRect/>
+          </a:stretch>
+        </p:blipFill>
+        <p:spPr>
+          <a:xfrm>
+            <a:off x="273640" y="1867112"/>
+            <a:ext cx="2661294" cy="1543957"/>
+          </a:xfrm>
+          <a:prstGeom prst="rect">
+            <a:avLst/>
+          </a:prstGeom>
+          <a:ln>
+            <a:gradFill>
+              <a:gsLst>
+                <a:gs pos="0">
+                  <a:schemeClr val="accent1">
+                    <a:lumMod val="5000"/>
+                    <a:lumOff val="95000"/>
+                  </a:schemeClr>
+                </a:gs>
+                <a:gs pos="74000">
+                  <a:schemeClr val="accent1">
+                    <a:lumMod val="45000"/>
+                    <a:lumOff val="55000"/>
+                  </a:schemeClr>
+                </a:gs>
+                <a:gs pos="83000">
+                  <a:schemeClr val="accent1">
+                    <a:lumMod val="45000"/>
+                    <a:lumOff val="55000"/>
+                  </a:schemeClr>
+                </a:gs>
+                <a:gs pos="100000">
+                  <a:schemeClr val="accent1">
+                    <a:lumMod val="30000"/>
+                    <a:lumOff val="70000"/>
+                  </a:schemeClr>
+                </a:gs>
+              </a:gsLst>
+              <a:lin ang="5400000" scaled="1"/>
+            </a:gradFill>
+          </a:ln>
+        </p:spPr>
+      </p:pic>
+      <p:pic>
+        <p:nvPicPr>
+          <p:cNvPr id="17" name="Picture 16"/>
+          <p:cNvPicPr>
+            <a:picLocks noChangeAspect="1"/>
+          </p:cNvPicPr>
+          <p:nvPr/>
+        </p:nvPicPr>
+        <p:blipFill>
+          <a:blip r:embed="rId4"/>
+          <a:stretch>
+            <a:fillRect/>
+          </a:stretch>
+        </p:blipFill>
+        <p:spPr>
+          <a:xfrm>
+            <a:off x="4695694" y="1041590"/>
+            <a:ext cx="4372931" cy="1470850"/>
+          </a:xfrm>
+          <a:prstGeom prst="rect">
+            <a:avLst/>
+          </a:prstGeom>
+        </p:spPr>
+      </p:pic>
+      <p:sp>
+        <p:nvSpPr>
+          <p:cNvPr id="2" name="Cube 1"/>
+          <p:cNvSpPr/>
+          <p:nvPr/>
+        </p:nvSpPr>
+        <p:spPr>
+          <a:xfrm>
+            <a:off x="3004454" y="2611084"/>
+            <a:ext cx="1070526" cy="1619988"/>
+          </a:xfrm>
+          <a:prstGeom prst="cube">
+            <a:avLst/>
+          </a:prstGeom>
+        </p:spPr>
+        <p:style>
+          <a:lnRef idx="1">
+            <a:schemeClr val="accent2"/>
+          </a:lnRef>
+          <a:fillRef idx="2">
+            <a:schemeClr val="accent2"/>
+          </a:fillRef>
+          <a:effectRef idx="1">
+            <a:schemeClr val="accent2"/>
+          </a:effectRef>
+          <a:fontRef idx="minor">
+            <a:schemeClr val="dk1"/>
+          </a:fontRef>
+        </p:style>
+        <p:txBody>
+          <a:bodyPr rtlCol="0" anchor="ctr"/>
+          <a:lstStyle/>
+          <a:p>
+            <a:pPr algn="ctr"/>
+            <a:endParaRPr lang="en-US" sz="1100" dirty="0">
+              <a:solidFill>
+                <a:schemeClr val="accent2">
+                  <a:lumMod val="75000"/>
+                </a:schemeClr>
+              </a:solidFill>
+            </a:endParaRPr>
+          </a:p>
+        </p:txBody>
+      </p:sp>
+      <p:sp>
+        <p:nvSpPr>
+          <p:cNvPr id="3" name="Cube 2"/>
+          <p:cNvSpPr/>
+          <p:nvPr/>
+        </p:nvSpPr>
+        <p:spPr>
+          <a:xfrm>
+            <a:off x="3075823" y="2229447"/>
+            <a:ext cx="927789" cy="545196"/>
+          </a:xfrm>
+          <a:prstGeom prst="cube">
+            <a:avLst/>
+          </a:prstGeom>
+        </p:spPr>
+        <p:style>
+          <a:lnRef idx="1">
+            <a:schemeClr val="accent2"/>
+          </a:lnRef>
+          <a:fillRef idx="3">
+            <a:schemeClr val="accent2"/>
+          </a:fillRef>
+          <a:effectRef idx="2">
+            <a:schemeClr val="accent2"/>
+          </a:effectRef>
+          <a:fontRef idx="minor">
+            <a:schemeClr val="lt1"/>
+          </a:fontRef>
+        </p:style>
+        <p:txBody>
+          <a:bodyPr rtlCol="0" anchor="ctr"/>
+          <a:lstStyle/>
+          <a:p>
+            <a:pPr algn="ctr"/>
+            <a:r>
+              <a:rPr lang="nl-NL" sz="1400" dirty="0" err="1" smtClean="0"/>
+              <a:t>Doc</a:t>
+            </a:r>
+            <a:r>
+              <a:rPr lang="nl-NL" sz="1400" dirty="0" smtClean="0"/>
+              <a:t> CS</a:t>
+            </a:r>
+            <a:endParaRPr lang="en-US" sz="1400" dirty="0"/>
+          </a:p>
+        </p:txBody>
+      </p:sp>
+      <p:sp>
+        <p:nvSpPr>
+          <p:cNvPr id="4" name="Cube 3"/>
+          <p:cNvSpPr/>
+          <p:nvPr/>
+        </p:nvSpPr>
+        <p:spPr>
+          <a:xfrm>
+            <a:off x="4860032" y="2348880"/>
+            <a:ext cx="1070526" cy="1619988"/>
+          </a:xfrm>
+          <a:prstGeom prst="cube">
+            <a:avLst/>
+          </a:prstGeom>
+        </p:spPr>
+        <p:style>
+          <a:lnRef idx="1">
+            <a:schemeClr val="accent2"/>
+          </a:lnRef>
+          <a:fillRef idx="2">
+            <a:schemeClr val="accent2"/>
+          </a:fillRef>
+          <a:effectRef idx="1">
+            <a:schemeClr val="accent2"/>
+          </a:effectRef>
+          <a:fontRef idx="minor">
+            <a:schemeClr val="dk1"/>
+          </a:fontRef>
+        </p:style>
+        <p:txBody>
+          <a:bodyPr rtlCol="0" anchor="ctr"/>
+          <a:lstStyle/>
+          <a:p>
+            <a:pPr algn="ctr"/>
+            <a:endParaRPr lang="en-US" sz="1100" dirty="0">
+              <a:solidFill>
+                <a:schemeClr val="accent2">
+                  <a:lumMod val="75000"/>
+                </a:schemeClr>
+              </a:solidFill>
+            </a:endParaRPr>
+          </a:p>
+        </p:txBody>
+      </p:sp>
+      <p:sp>
+        <p:nvSpPr>
+          <p:cNvPr id="5" name="Cube 4"/>
+          <p:cNvSpPr/>
+          <p:nvPr/>
+        </p:nvSpPr>
+        <p:spPr>
+          <a:xfrm>
+            <a:off x="4931401" y="1967244"/>
+            <a:ext cx="927789" cy="545196"/>
+          </a:xfrm>
+          <a:prstGeom prst="cube">
+            <a:avLst/>
+          </a:prstGeom>
+        </p:spPr>
+        <p:style>
+          <a:lnRef idx="1">
+            <a:schemeClr val="accent2"/>
+          </a:lnRef>
+          <a:fillRef idx="3">
+            <a:schemeClr val="accent2"/>
+          </a:fillRef>
+          <a:effectRef idx="2">
+            <a:schemeClr val="accent2"/>
+          </a:effectRef>
+          <a:fontRef idx="minor">
+            <a:schemeClr val="lt1"/>
+          </a:fontRef>
+        </p:style>
+        <p:txBody>
+          <a:bodyPr rtlCol="0" anchor="ctr"/>
+          <a:lstStyle/>
+          <a:p>
+            <a:pPr algn="ctr"/>
+            <a:r>
+              <a:rPr lang="nl-NL" sz="1400" dirty="0"/>
+              <a:t>P</a:t>
+            </a:r>
+            <a:r>
+              <a:rPr lang="nl-NL" sz="1400" dirty="0" smtClean="0"/>
+              <a:t>CS</a:t>
+            </a:r>
+            <a:endParaRPr lang="en-US" sz="1400" dirty="0"/>
+          </a:p>
+        </p:txBody>
+      </p:sp>
+      <p:sp>
+        <p:nvSpPr>
+          <p:cNvPr id="6" name="Cube 5"/>
+          <p:cNvSpPr/>
+          <p:nvPr/>
+        </p:nvSpPr>
+        <p:spPr>
+          <a:xfrm>
+            <a:off x="3611086" y="3199048"/>
+            <a:ext cx="1070526" cy="1619988"/>
+          </a:xfrm>
+          <a:prstGeom prst="cube">
+            <a:avLst/>
+          </a:prstGeom>
+        </p:spPr>
+        <p:style>
+          <a:lnRef idx="1">
+            <a:schemeClr val="accent2"/>
+          </a:lnRef>
+          <a:fillRef idx="2">
+            <a:schemeClr val="accent2"/>
+          </a:fillRef>
+          <a:effectRef idx="1">
+            <a:schemeClr val="accent2"/>
+          </a:effectRef>
+          <a:fontRef idx="minor">
+            <a:schemeClr val="dk1"/>
+          </a:fontRef>
+        </p:style>
+        <p:txBody>
+          <a:bodyPr rtlCol="0" anchor="ctr"/>
+          <a:lstStyle/>
+          <a:p>
+            <a:pPr algn="ctr"/>
+            <a:endParaRPr lang="en-US" sz="1100" dirty="0">
+              <a:solidFill>
+                <a:schemeClr val="accent2">
+                  <a:lumMod val="75000"/>
+                </a:schemeClr>
+              </a:solidFill>
+            </a:endParaRPr>
+          </a:p>
+        </p:txBody>
+      </p:sp>
+      <p:sp>
+        <p:nvSpPr>
+          <p:cNvPr id="7" name="Cube 6"/>
+          <p:cNvSpPr/>
+          <p:nvPr/>
+        </p:nvSpPr>
+        <p:spPr>
+          <a:xfrm>
+            <a:off x="3682454" y="2817412"/>
+            <a:ext cx="927789" cy="545196"/>
+          </a:xfrm>
+          <a:prstGeom prst="cube">
+            <a:avLst/>
+          </a:prstGeom>
+        </p:spPr>
+        <p:style>
+          <a:lnRef idx="1">
+            <a:schemeClr val="accent2"/>
+          </a:lnRef>
+          <a:fillRef idx="3">
+            <a:schemeClr val="accent2"/>
+          </a:fillRef>
+          <a:effectRef idx="2">
+            <a:schemeClr val="accent2"/>
+          </a:effectRef>
+          <a:fontRef idx="minor">
+            <a:schemeClr val="lt1"/>
+          </a:fontRef>
+        </p:style>
+        <p:txBody>
+          <a:bodyPr rtlCol="0" anchor="ctr"/>
+          <a:lstStyle/>
+          <a:p>
+            <a:pPr algn="ctr"/>
+            <a:r>
+              <a:rPr lang="nl-NL" sz="1400" dirty="0" smtClean="0"/>
+              <a:t>OSN</a:t>
+            </a:r>
+            <a:endParaRPr lang="en-US" sz="1400" dirty="0"/>
+          </a:p>
+        </p:txBody>
+      </p:sp>
+      <p:sp>
+        <p:nvSpPr>
+          <p:cNvPr id="8" name="Cube 7"/>
+          <p:cNvSpPr/>
+          <p:nvPr/>
+        </p:nvSpPr>
+        <p:spPr>
+          <a:xfrm>
+            <a:off x="5288242" y="1885464"/>
+            <a:ext cx="214106" cy="163559"/>
+          </a:xfrm>
+          <a:prstGeom prst="cube">
+            <a:avLst/>
+          </a:prstGeom>
+        </p:spPr>
+        <p:style>
+          <a:lnRef idx="2">
+            <a:schemeClr val="accent1">
+              <a:shade val="50000"/>
+            </a:schemeClr>
+          </a:lnRef>
+          <a:fillRef idx="1">
+            <a:schemeClr val="accent1"/>
+          </a:fillRef>
+          <a:effectRef idx="0">
+            <a:schemeClr val="accent1"/>
+          </a:effectRef>
+          <a:fontRef idx="minor">
+            <a:schemeClr val="lt1"/>
+          </a:fontRef>
+        </p:style>
+        <p:txBody>
+          <a:bodyPr rtlCol="0" anchor="ctr"/>
+          <a:lstStyle/>
+          <a:p>
+            <a:pPr algn="ctr"/>
+            <a:endParaRPr lang="en-US" sz="1600"/>
+          </a:p>
+        </p:txBody>
+      </p:sp>
+      <p:cxnSp>
+        <p:nvCxnSpPr>
+          <p:cNvPr id="9" name="Straight Arrow Connector 8"/>
+          <p:cNvCxnSpPr>
+            <a:stCxn id="8" idx="2"/>
+            <a:endCxn id="3" idx="5"/>
+          </p:cNvCxnSpPr>
+          <p:nvPr/>
+        </p:nvCxnSpPr>
+        <p:spPr>
+          <a:xfrm flipH="1">
+            <a:off x="4003612" y="1987689"/>
+            <a:ext cx="1284631" cy="446207"/>
+          </a:xfrm>
+          <a:prstGeom prst="straightConnector1">
+            <a:avLst/>
+          </a:prstGeom>
+          <a:ln w="19050">
+            <a:solidFill>
+              <a:schemeClr val="accent2">
+                <a:lumMod val="75000"/>
+              </a:schemeClr>
+            </a:solidFill>
+            <a:tailEnd type="arrow"/>
+          </a:ln>
+        </p:spPr>
+        <p:style>
+          <a:lnRef idx="1">
+            <a:schemeClr val="accent1"/>
+          </a:lnRef>
+          <a:fillRef idx="0">
+            <a:schemeClr val="accent1"/>
+          </a:fillRef>
+          <a:effectRef idx="0">
+            <a:schemeClr val="accent1"/>
+          </a:effectRef>
+          <a:fontRef idx="minor">
+            <a:schemeClr val="tx1"/>
+          </a:fontRef>
+        </p:style>
+      </p:cxnSp>
+      <p:cxnSp>
+        <p:nvCxnSpPr>
+          <p:cNvPr id="10" name="Straight Arrow Connector 9"/>
+          <p:cNvCxnSpPr>
+            <a:stCxn id="8" idx="3"/>
+            <a:endCxn id="7" idx="0"/>
+          </p:cNvCxnSpPr>
+          <p:nvPr/>
+        </p:nvCxnSpPr>
+        <p:spPr>
+          <a:xfrm flipH="1">
+            <a:off x="4235559" y="2049023"/>
+            <a:ext cx="1132973" cy="768389"/>
+          </a:xfrm>
+          <a:prstGeom prst="straightConnector1">
+            <a:avLst/>
+          </a:prstGeom>
+          <a:ln w="19050">
+            <a:solidFill>
+              <a:schemeClr val="accent2">
+                <a:lumMod val="75000"/>
+              </a:schemeClr>
+            </a:solidFill>
+            <a:tailEnd type="arrow"/>
+          </a:ln>
+        </p:spPr>
+        <p:style>
+          <a:lnRef idx="1">
+            <a:schemeClr val="accent1"/>
+          </a:lnRef>
+          <a:fillRef idx="0">
+            <a:schemeClr val="accent1"/>
+          </a:fillRef>
+          <a:effectRef idx="0">
+            <a:schemeClr val="accent1"/>
+          </a:effectRef>
+          <a:fontRef idx="minor">
+            <a:schemeClr val="tx1"/>
+          </a:fontRef>
+        </p:style>
+      </p:cxnSp>
+      <p:sp>
+        <p:nvSpPr>
+          <p:cNvPr id="11" name="Cube 10"/>
+          <p:cNvSpPr/>
+          <p:nvPr/>
+        </p:nvSpPr>
+        <p:spPr>
+          <a:xfrm>
+            <a:off x="5006487" y="3292922"/>
+            <a:ext cx="1070526" cy="1619988"/>
+          </a:xfrm>
+          <a:prstGeom prst="cube">
+            <a:avLst/>
+          </a:prstGeom>
+        </p:spPr>
+        <p:style>
+          <a:lnRef idx="1">
+            <a:schemeClr val="accent2"/>
+          </a:lnRef>
+          <a:fillRef idx="2">
+            <a:schemeClr val="accent2"/>
+          </a:fillRef>
+          <a:effectRef idx="1">
+            <a:schemeClr val="accent2"/>
+          </a:effectRef>
+          <a:fontRef idx="minor">
+            <a:schemeClr val="dk1"/>
+          </a:fontRef>
+        </p:style>
+        <p:txBody>
+          <a:bodyPr rtlCol="0" anchor="ctr"/>
+          <a:lstStyle/>
+          <a:p>
+            <a:pPr algn="ctr"/>
+            <a:endParaRPr lang="en-US" sz="1100" dirty="0">
+              <a:solidFill>
+                <a:schemeClr val="accent2">
+                  <a:lumMod val="75000"/>
+                </a:schemeClr>
+              </a:solidFill>
+            </a:endParaRPr>
+          </a:p>
+        </p:txBody>
+      </p:sp>
+      <p:sp>
+        <p:nvSpPr>
+          <p:cNvPr id="12" name="Cube 11"/>
+          <p:cNvSpPr/>
+          <p:nvPr/>
+        </p:nvSpPr>
+        <p:spPr>
+          <a:xfrm>
+            <a:off x="5077855" y="2911286"/>
+            <a:ext cx="927789" cy="545196"/>
+          </a:xfrm>
+          <a:prstGeom prst="cube">
+            <a:avLst/>
+          </a:prstGeom>
+        </p:spPr>
+        <p:style>
+          <a:lnRef idx="1">
+            <a:schemeClr val="accent2"/>
+          </a:lnRef>
+          <a:fillRef idx="3">
+            <a:schemeClr val="accent2"/>
+          </a:fillRef>
+          <a:effectRef idx="2">
+            <a:schemeClr val="accent2"/>
+          </a:effectRef>
+          <a:fontRef idx="minor">
+            <a:schemeClr val="lt1"/>
+          </a:fontRef>
+        </p:style>
+        <p:txBody>
+          <a:bodyPr rtlCol="0" anchor="ctr"/>
+          <a:lstStyle/>
+          <a:p>
+            <a:pPr algn="ctr"/>
+            <a:r>
+              <a:rPr lang="nl-NL" sz="1400" dirty="0" smtClean="0"/>
+              <a:t>Sites CS</a:t>
+            </a:r>
+            <a:endParaRPr lang="en-US" sz="1400" dirty="0"/>
+          </a:p>
+        </p:txBody>
+      </p:sp>
+      <p:cxnSp>
+        <p:nvCxnSpPr>
+          <p:cNvPr id="13" name="Straight Arrow Connector 12"/>
+          <p:cNvCxnSpPr>
+            <a:stCxn id="8" idx="4"/>
+            <a:endCxn id="12" idx="0"/>
+          </p:cNvCxnSpPr>
+          <p:nvPr/>
+        </p:nvCxnSpPr>
+        <p:spPr>
+          <a:xfrm>
+            <a:off x="5448821" y="1987689"/>
+            <a:ext cx="182138" cy="923597"/>
+          </a:xfrm>
+          <a:prstGeom prst="straightConnector1">
+            <a:avLst/>
+          </a:prstGeom>
+          <a:ln w="19050">
+            <a:solidFill>
+              <a:schemeClr val="accent2">
+                <a:lumMod val="75000"/>
+              </a:schemeClr>
+            </a:solidFill>
+            <a:tailEnd type="arrow"/>
+          </a:ln>
+        </p:spPr>
+        <p:style>
+          <a:lnRef idx="1">
+            <a:schemeClr val="accent1"/>
+          </a:lnRef>
+          <a:fillRef idx="0">
+            <a:schemeClr val="accent1"/>
+          </a:fillRef>
+          <a:effectRef idx="0">
+            <a:schemeClr val="accent1"/>
+          </a:effectRef>
+          <a:fontRef idx="minor">
+            <a:schemeClr val="tx1"/>
+          </a:fontRef>
+        </p:style>
+      </p:cxnSp>
+      <p:sp>
+        <p:nvSpPr>
+          <p:cNvPr id="14" name="Titel 1"/>
+          <p:cNvSpPr txBox="1">
+            <a:spLocks/>
+          </p:cNvSpPr>
+          <p:nvPr/>
+        </p:nvSpPr>
+        <p:spPr>
+          <a:xfrm>
+            <a:off x="457200" y="274638"/>
+            <a:ext cx="8229600" cy="1143000"/>
+          </a:xfrm>
+          <a:prstGeom prst="rect">
+            <a:avLst/>
+          </a:prstGeom>
+        </p:spPr>
+        <p:txBody>
+          <a:bodyPr/>
+          <a:lstStyle>
+            <a:lvl1pPr algn="ctr" defTabSz="914400" rtl="0" eaLnBrk="1" latinLnBrk="0" hangingPunct="1">
+              <a:spcBef>
+                <a:spcPct val="0"/>
+              </a:spcBef>
+              <a:buNone/>
+              <a:defRPr sz="4400" kern="1200">
+                <a:solidFill>
+                  <a:schemeClr val="tx1"/>
+                </a:solidFill>
+                <a:latin typeface="+mj-lt"/>
+                <a:ea typeface="+mj-ea"/>
+                <a:cs typeface="+mj-cs"/>
+              </a:defRPr>
+            </a:lvl1pPr>
+          </a:lstStyle>
+          <a:p>
+            <a:r>
+              <a:rPr lang="en-US" dirty="0" smtClean="0"/>
+              <a:t>Content and Process</a:t>
+            </a:r>
+            <a:endParaRPr lang="en-US" dirty="0"/>
+          </a:p>
+        </p:txBody>
+      </p:sp>
+      <p:pic>
+        <p:nvPicPr>
+          <p:cNvPr id="15" name="Picture 14"/>
+          <p:cNvPicPr>
+            <a:picLocks noChangeAspect="1"/>
+          </p:cNvPicPr>
+          <p:nvPr/>
+        </p:nvPicPr>
+        <p:blipFill>
+          <a:blip r:embed="rId5"/>
+          <a:stretch>
+            <a:fillRect/>
+          </a:stretch>
+        </p:blipFill>
+        <p:spPr>
+          <a:xfrm>
+            <a:off x="6569605" y="4077149"/>
+            <a:ext cx="1918531" cy="2622541"/>
+          </a:xfrm>
+          <a:prstGeom prst="rect">
+            <a:avLst/>
+          </a:prstGeom>
+        </p:spPr>
+      </p:pic>
+      <p:sp>
+        <p:nvSpPr>
+          <p:cNvPr id="16" name="Rectangular Callout 15"/>
+          <p:cNvSpPr/>
+          <p:nvPr/>
+        </p:nvSpPr>
+        <p:spPr>
+          <a:xfrm>
+            <a:off x="4159012" y="5388419"/>
+            <a:ext cx="1944216" cy="848892"/>
+          </a:xfrm>
+          <a:prstGeom prst="wedgeRectCallout">
+            <a:avLst>
+              <a:gd name="adj1" fmla="val 78832"/>
+              <a:gd name="adj2" fmla="val -26904"/>
+            </a:avLst>
+          </a:prstGeom>
+        </p:spPr>
+        <p:style>
+          <a:lnRef idx="2">
+            <a:schemeClr val="accent6">
+              <a:shade val="50000"/>
+            </a:schemeClr>
+          </a:lnRef>
+          <a:fillRef idx="1">
+            <a:schemeClr val="accent6"/>
+          </a:fillRef>
+          <a:effectRef idx="0">
+            <a:schemeClr val="accent6"/>
+          </a:effectRef>
+          <a:fontRef idx="minor">
+            <a:schemeClr val="lt1"/>
+          </a:fontRef>
+        </p:style>
+        <p:txBody>
+          <a:bodyPr rtlCol="0" anchor="ctr"/>
+          <a:lstStyle/>
+          <a:p>
+            <a:pPr algn="ctr"/>
+            <a:r>
+              <a:rPr lang="nl-NL" sz="1400" dirty="0" smtClean="0"/>
+              <a:t>Responsive Microsite Page Built with the authorised Image stored in DCS</a:t>
+            </a:r>
+            <a:endParaRPr lang="en-US" sz="1400" dirty="0"/>
+          </a:p>
+        </p:txBody>
+      </p:sp>
+      <p:sp>
+        <p:nvSpPr>
+          <p:cNvPr id="18" name="Rectangular Callout 17"/>
+          <p:cNvSpPr/>
+          <p:nvPr/>
+        </p:nvSpPr>
+        <p:spPr>
+          <a:xfrm>
+            <a:off x="6742584" y="2774643"/>
+            <a:ext cx="2077888" cy="1014397"/>
+          </a:xfrm>
+          <a:prstGeom prst="wedgeRectCallout">
+            <a:avLst>
+              <a:gd name="adj1" fmla="val -38129"/>
+              <a:gd name="adj2" fmla="val -103525"/>
+            </a:avLst>
+          </a:prstGeom>
+        </p:spPr>
+        <p:style>
+          <a:lnRef idx="2">
+            <a:schemeClr val="accent6">
+              <a:shade val="50000"/>
+            </a:schemeClr>
+          </a:lnRef>
+          <a:fillRef idx="1">
+            <a:schemeClr val="accent6"/>
+          </a:fillRef>
+          <a:effectRef idx="0">
+            <a:schemeClr val="accent6"/>
+          </a:effectRef>
+          <a:fontRef idx="minor">
+            <a:schemeClr val="lt1"/>
+          </a:fontRef>
+        </p:style>
+        <p:txBody>
+          <a:bodyPr rtlCol="0" anchor="ctr"/>
+          <a:lstStyle/>
+          <a:p>
+            <a:pPr algn="ctr"/>
+            <a:r>
+              <a:rPr lang="nl-NL" sz="1400" dirty="0" smtClean="0"/>
+              <a:t>Business Process receives IoT message  and sends to reviewer for ennrichment and authorisation</a:t>
+            </a:r>
+            <a:endParaRPr lang="en-US" sz="1400" dirty="0"/>
+          </a:p>
+        </p:txBody>
+      </p:sp>
+      <p:sp>
+        <p:nvSpPr>
+          <p:cNvPr id="19" name="Rectangular Callout 18"/>
+          <p:cNvSpPr/>
+          <p:nvPr/>
+        </p:nvSpPr>
+        <p:spPr>
+          <a:xfrm>
+            <a:off x="2047313" y="1100221"/>
+            <a:ext cx="2302340" cy="721974"/>
+          </a:xfrm>
+          <a:prstGeom prst="wedgeRectCallout">
+            <a:avLst>
+              <a:gd name="adj1" fmla="val -47288"/>
+              <a:gd name="adj2" fmla="val 75685"/>
+            </a:avLst>
+          </a:prstGeom>
+        </p:spPr>
+        <p:style>
+          <a:lnRef idx="2">
+            <a:schemeClr val="accent6">
+              <a:shade val="50000"/>
+            </a:schemeClr>
+          </a:lnRef>
+          <a:fillRef idx="1">
+            <a:schemeClr val="accent6"/>
+          </a:fillRef>
+          <a:effectRef idx="0">
+            <a:schemeClr val="accent6"/>
+          </a:effectRef>
+          <a:fontRef idx="minor">
+            <a:schemeClr val="lt1"/>
+          </a:fontRef>
+        </p:style>
+        <p:txBody>
+          <a:bodyPr rtlCol="0" anchor="ctr"/>
+          <a:lstStyle/>
+          <a:p>
+            <a:pPr algn="ctr"/>
+            <a:r>
+              <a:rPr lang="nl-NL" sz="1400" dirty="0" smtClean="0"/>
+              <a:t>Doc Cloud used to store marketing images for display in JET app and Sites Page</a:t>
+            </a:r>
+            <a:endParaRPr lang="en-US" sz="1400" dirty="0"/>
+          </a:p>
+        </p:txBody>
+      </p:sp>
+      <p:sp>
+        <p:nvSpPr>
+          <p:cNvPr id="20" name="Rectangular Callout 19"/>
+          <p:cNvSpPr/>
+          <p:nvPr/>
+        </p:nvSpPr>
+        <p:spPr>
+          <a:xfrm>
+            <a:off x="1475656" y="5827351"/>
+            <a:ext cx="2302340" cy="721974"/>
+          </a:xfrm>
+          <a:prstGeom prst="wedgeRectCallout">
+            <a:avLst>
+              <a:gd name="adj1" fmla="val -36314"/>
+              <a:gd name="adj2" fmla="val -99295"/>
+            </a:avLst>
+          </a:prstGeom>
+        </p:spPr>
+        <p:style>
+          <a:lnRef idx="2">
+            <a:schemeClr val="accent6">
+              <a:shade val="50000"/>
+            </a:schemeClr>
+          </a:lnRef>
+          <a:fillRef idx="1">
+            <a:schemeClr val="accent6"/>
+          </a:fillRef>
+          <a:effectRef idx="0">
+            <a:schemeClr val="accent6"/>
+          </a:effectRef>
+          <a:fontRef idx="minor">
+            <a:schemeClr val="lt1"/>
+          </a:fontRef>
+        </p:style>
+        <p:txBody>
+          <a:bodyPr rtlCol="0" anchor="ctr"/>
+          <a:lstStyle/>
+          <a:p>
+            <a:pPr algn="ctr"/>
+            <a:r>
+              <a:rPr lang="nl-NL" sz="1400" dirty="0" smtClean="0"/>
+              <a:t>Social Network used to discuss the marketing image, description and approval</a:t>
+            </a:r>
+            <a:endParaRPr lang="en-US" sz="1400" dirty="0"/>
+          </a:p>
+        </p:txBody>
+      </p:sp>
+    </p:spTree>
+    <p:extLst>
+      <p:ext uri="{BB962C8B-B14F-4D97-AF65-F5344CB8AC3E}">
+        <p14:creationId xmlns:p14="http://schemas.microsoft.com/office/powerpoint/2010/main" val="696144400"/>
       </p:ext>
     </p:extLst>
   </p:cSld>

</xml_diff>

<commit_message>
Added bit.ly url to web app to all Wilfred's slides
</commit_message>
<xml_diff>
--- a/soaring-through-the-clouds-ofmw-forum2016-valencia-demo.pptx
+++ b/soaring-through-the-clouds-ofmw-forum2016-valencia-demo.pptx
@@ -510,8 +510,8 @@
         </p:nvSpPr>
         <p:spPr>
           <a:xfrm>
-            <a:off x="381300" y="685800"/>
-            <a:ext cx="6096000" cy="3429000"/>
+            <a:off x="1143000" y="685800"/>
+            <a:ext cx="4572000" cy="3429000"/>
           </a:xfrm>
           <a:custGeom>
             <a:avLst/>
@@ -611,8 +611,8 @@
         </p:nvSpPr>
         <p:spPr>
           <a:xfrm>
-            <a:off x="381300" y="685800"/>
-            <a:ext cx="6096000" cy="3429000"/>
+            <a:off x="1143000" y="685800"/>
+            <a:ext cx="4572000" cy="3429000"/>
           </a:xfrm>
           <a:custGeom>
             <a:avLst/>
@@ -712,8 +712,8 @@
         </p:nvSpPr>
         <p:spPr>
           <a:xfrm>
-            <a:off x="381300" y="685800"/>
-            <a:ext cx="6096000" cy="3429000"/>
+            <a:off x="1143000" y="685800"/>
+            <a:ext cx="4572000" cy="3429000"/>
           </a:xfrm>
           <a:custGeom>
             <a:avLst/>
@@ -813,8 +813,8 @@
         </p:nvSpPr>
         <p:spPr>
           <a:xfrm>
-            <a:off x="381300" y="685800"/>
-            <a:ext cx="6096000" cy="3429000"/>
+            <a:off x="1143000" y="685800"/>
+            <a:ext cx="4572000" cy="3429000"/>
           </a:xfrm>
           <a:custGeom>
             <a:avLst/>
@@ -914,8 +914,8 @@
         </p:nvSpPr>
         <p:spPr>
           <a:xfrm>
-            <a:off x="381300" y="685800"/>
-            <a:ext cx="6096000" cy="3429000"/>
+            <a:off x="1143000" y="685800"/>
+            <a:ext cx="4572000" cy="3429000"/>
           </a:xfrm>
           <a:custGeom>
             <a:avLst/>
@@ -1015,8 +1015,8 @@
         </p:nvSpPr>
         <p:spPr>
           <a:xfrm>
-            <a:off x="381300" y="685800"/>
-            <a:ext cx="6096000" cy="3429000"/>
+            <a:off x="1143000" y="685800"/>
+            <a:ext cx="4572000" cy="3429000"/>
           </a:xfrm>
           <a:custGeom>
             <a:avLst/>
@@ -1116,8 +1116,8 @@
         </p:nvSpPr>
         <p:spPr>
           <a:xfrm>
-            <a:off x="381300" y="685800"/>
-            <a:ext cx="6096000" cy="3429000"/>
+            <a:off x="1143000" y="685800"/>
+            <a:ext cx="4572000" cy="3429000"/>
           </a:xfrm>
           <a:custGeom>
             <a:avLst/>
@@ -1217,8 +1217,8 @@
         </p:nvSpPr>
         <p:spPr>
           <a:xfrm>
-            <a:off x="381300" y="685800"/>
-            <a:ext cx="6096000" cy="3429000"/>
+            <a:off x="1143000" y="685800"/>
+            <a:ext cx="4572000" cy="3429000"/>
           </a:xfrm>
           <a:custGeom>
             <a:avLst/>
@@ -1318,8 +1318,8 @@
         </p:nvSpPr>
         <p:spPr>
           <a:xfrm>
-            <a:off x="381300" y="685800"/>
-            <a:ext cx="6096000" cy="3429000"/>
+            <a:off x="1143000" y="685800"/>
+            <a:ext cx="4572000" cy="3429000"/>
           </a:xfrm>
           <a:custGeom>
             <a:avLst/>
@@ -4980,6 +4980,43 @@
           </a:p>
         </p:txBody>
       </p:sp>
+      <p:sp>
+        <p:nvSpPr>
+          <p:cNvPr id="8" name="TextBox 7"/>
+          <p:cNvSpPr txBox="1"/>
+          <p:nvPr/>
+        </p:nvSpPr>
+        <p:spPr>
+          <a:xfrm>
+            <a:off x="5585953" y="44624"/>
+            <a:ext cx="3666567" cy="369332"/>
+          </a:xfrm>
+          <a:prstGeom prst="rect">
+            <a:avLst/>
+          </a:prstGeom>
+          <a:noFill/>
+        </p:spPr>
+        <p:txBody>
+          <a:bodyPr wrap="square" rtlCol="0">
+            <a:spAutoFit/>
+          </a:bodyPr>
+          <a:lstStyle/>
+          <a:p>
+            <a:r>
+              <a:rPr lang="en-US" dirty="0" smtClean="0"/>
+              <a:t>JET Web App : </a:t>
+            </a:r>
+            <a:r>
+              <a:rPr lang="en-US" b="1" dirty="0" smtClean="0"/>
+              <a:t>http</a:t>
+            </a:r>
+            <a:r>
+              <a:rPr lang="en-US" b="1" dirty="0"/>
+              <a:t>://bit.ly/1L5kIJM</a:t>
+            </a:r>
+          </a:p>
+        </p:txBody>
+      </p:sp>
     </p:spTree>
     <p:extLst>
       <p:ext uri="{BB962C8B-B14F-4D97-AF65-F5344CB8AC3E}">
@@ -5242,6 +5279,43 @@
           </a:p>
         </p:txBody>
       </p:sp>
+      <p:sp>
+        <p:nvSpPr>
+          <p:cNvPr id="8" name="TextBox 7"/>
+          <p:cNvSpPr txBox="1"/>
+          <p:nvPr/>
+        </p:nvSpPr>
+        <p:spPr>
+          <a:xfrm>
+            <a:off x="5585953" y="44624"/>
+            <a:ext cx="3666567" cy="369332"/>
+          </a:xfrm>
+          <a:prstGeom prst="rect">
+            <a:avLst/>
+          </a:prstGeom>
+          <a:noFill/>
+        </p:spPr>
+        <p:txBody>
+          <a:bodyPr wrap="square" rtlCol="0">
+            <a:spAutoFit/>
+          </a:bodyPr>
+          <a:lstStyle/>
+          <a:p>
+            <a:r>
+              <a:rPr lang="en-US" dirty="0" smtClean="0"/>
+              <a:t>JET Web App : </a:t>
+            </a:r>
+            <a:r>
+              <a:rPr lang="en-US" b="1" dirty="0" smtClean="0"/>
+              <a:t>http</a:t>
+            </a:r>
+            <a:r>
+              <a:rPr lang="en-US" b="1" dirty="0"/>
+              <a:t>://bit.ly/1L5kIJM</a:t>
+            </a:r>
+          </a:p>
+        </p:txBody>
+      </p:sp>
     </p:spTree>
     <p:extLst>
       <p:ext uri="{BB962C8B-B14F-4D97-AF65-F5344CB8AC3E}">
@@ -5568,6 +5642,43 @@
               <a:cs typeface="Consolas"/>
               <a:sym typeface="Consolas"/>
             </a:endParaRPr>
+          </a:p>
+        </p:txBody>
+      </p:sp>
+      <p:sp>
+        <p:nvSpPr>
+          <p:cNvPr id="4" name="TextBox 3"/>
+          <p:cNvSpPr txBox="1"/>
+          <p:nvPr/>
+        </p:nvSpPr>
+        <p:spPr>
+          <a:xfrm>
+            <a:off x="5585953" y="44624"/>
+            <a:ext cx="3666567" cy="369332"/>
+          </a:xfrm>
+          <a:prstGeom prst="rect">
+            <a:avLst/>
+          </a:prstGeom>
+          <a:noFill/>
+        </p:spPr>
+        <p:txBody>
+          <a:bodyPr wrap="square" rtlCol="0">
+            <a:spAutoFit/>
+          </a:bodyPr>
+          <a:lstStyle/>
+          <a:p>
+            <a:r>
+              <a:rPr lang="en-US" dirty="0" smtClean="0"/>
+              <a:t>JET Web App : </a:t>
+            </a:r>
+            <a:r>
+              <a:rPr lang="en-US" b="1" dirty="0" smtClean="0"/>
+              <a:t>http</a:t>
+            </a:r>
+            <a:r>
+              <a:rPr lang="en-US" b="1" dirty="0"/>
+              <a:t>://bit.ly/1L5kIJM</a:t>
+            </a:r>
           </a:p>
         </p:txBody>
       </p:sp>
@@ -6018,6 +6129,43 @@
           </a:p>
         </p:txBody>
       </p:sp>
+      <p:sp>
+        <p:nvSpPr>
+          <p:cNvPr id="4" name="TextBox 3"/>
+          <p:cNvSpPr txBox="1"/>
+          <p:nvPr/>
+        </p:nvSpPr>
+        <p:spPr>
+          <a:xfrm>
+            <a:off x="5585953" y="44624"/>
+            <a:ext cx="3666567" cy="369332"/>
+          </a:xfrm>
+          <a:prstGeom prst="rect">
+            <a:avLst/>
+          </a:prstGeom>
+          <a:noFill/>
+        </p:spPr>
+        <p:txBody>
+          <a:bodyPr wrap="square" rtlCol="0">
+            <a:spAutoFit/>
+          </a:bodyPr>
+          <a:lstStyle/>
+          <a:p>
+            <a:r>
+              <a:rPr lang="en-US" dirty="0" smtClean="0"/>
+              <a:t>JET Web App : </a:t>
+            </a:r>
+            <a:r>
+              <a:rPr lang="en-US" b="1" dirty="0" smtClean="0"/>
+              <a:t>http</a:t>
+            </a:r>
+            <a:r>
+              <a:rPr lang="en-US" b="1" dirty="0"/>
+              <a:t>://bit.ly/1L5kIJM</a:t>
+            </a:r>
+          </a:p>
+        </p:txBody>
+      </p:sp>
     </p:spTree>
     <p:extLst>
       <p:ext uri="{BB962C8B-B14F-4D97-AF65-F5344CB8AC3E}">
@@ -6407,6 +6555,43 @@
             <a:r>
               <a:rPr lang="en"/>
               <a:t>Having the browser invoke a REST API on same server that hosts html and js prevents Cross-Origin issues</a:t>
+            </a:r>
+          </a:p>
+        </p:txBody>
+      </p:sp>
+      <p:sp>
+        <p:nvSpPr>
+          <p:cNvPr id="9" name="TextBox 8"/>
+          <p:cNvSpPr txBox="1"/>
+          <p:nvPr/>
+        </p:nvSpPr>
+        <p:spPr>
+          <a:xfrm>
+            <a:off x="5585953" y="44624"/>
+            <a:ext cx="3666567" cy="369332"/>
+          </a:xfrm>
+          <a:prstGeom prst="rect">
+            <a:avLst/>
+          </a:prstGeom>
+          <a:noFill/>
+        </p:spPr>
+        <p:txBody>
+          <a:bodyPr wrap="square" rtlCol="0">
+            <a:spAutoFit/>
+          </a:bodyPr>
+          <a:lstStyle/>
+          <a:p>
+            <a:r>
+              <a:rPr lang="en-US" dirty="0" smtClean="0"/>
+              <a:t>JET Web App : </a:t>
+            </a:r>
+            <a:r>
+              <a:rPr lang="en-US" b="1" dirty="0" smtClean="0"/>
+              <a:t>http</a:t>
+            </a:r>
+            <a:r>
+              <a:rPr lang="en-US" b="1" dirty="0"/>
+              <a:t>://bit.ly/1L5kIJM</a:t>
             </a:r>
           </a:p>
         </p:txBody>
@@ -7070,6 +7255,43 @@
           </a:p>
         </p:txBody>
       </p:sp>
+      <p:sp>
+        <p:nvSpPr>
+          <p:cNvPr id="9" name="TextBox 8"/>
+          <p:cNvSpPr txBox="1"/>
+          <p:nvPr/>
+        </p:nvSpPr>
+        <p:spPr>
+          <a:xfrm>
+            <a:off x="5585953" y="44624"/>
+            <a:ext cx="3666567" cy="369332"/>
+          </a:xfrm>
+          <a:prstGeom prst="rect">
+            <a:avLst/>
+          </a:prstGeom>
+          <a:noFill/>
+        </p:spPr>
+        <p:txBody>
+          <a:bodyPr wrap="square" rtlCol="0">
+            <a:spAutoFit/>
+          </a:bodyPr>
+          <a:lstStyle/>
+          <a:p>
+            <a:r>
+              <a:rPr lang="en-US" dirty="0" smtClean="0"/>
+              <a:t>JET Web App : </a:t>
+            </a:r>
+            <a:r>
+              <a:rPr lang="en-US" b="1" dirty="0" smtClean="0"/>
+              <a:t>http</a:t>
+            </a:r>
+            <a:r>
+              <a:rPr lang="en-US" b="1" dirty="0"/>
+              <a:t>://bit.ly/1L5kIJM</a:t>
+            </a:r>
+          </a:p>
+        </p:txBody>
+      </p:sp>
     </p:spTree>
     <p:extLst>
       <p:ext uri="{BB962C8B-B14F-4D97-AF65-F5344CB8AC3E}">
@@ -7536,6 +7758,43 @@
               <a:cs typeface="Consolas"/>
               <a:sym typeface="Consolas"/>
             </a:endParaRPr>
+          </a:p>
+        </p:txBody>
+      </p:sp>
+      <p:sp>
+        <p:nvSpPr>
+          <p:cNvPr id="4" name="TextBox 3"/>
+          <p:cNvSpPr txBox="1"/>
+          <p:nvPr/>
+        </p:nvSpPr>
+        <p:spPr>
+          <a:xfrm>
+            <a:off x="5585953" y="44624"/>
+            <a:ext cx="3666567" cy="369332"/>
+          </a:xfrm>
+          <a:prstGeom prst="rect">
+            <a:avLst/>
+          </a:prstGeom>
+          <a:noFill/>
+        </p:spPr>
+        <p:txBody>
+          <a:bodyPr wrap="square" rtlCol="0">
+            <a:spAutoFit/>
+          </a:bodyPr>
+          <a:lstStyle/>
+          <a:p>
+            <a:r>
+              <a:rPr lang="en-US" dirty="0" smtClean="0"/>
+              <a:t>JET Web App : </a:t>
+            </a:r>
+            <a:r>
+              <a:rPr lang="en-US" b="1" dirty="0" smtClean="0"/>
+              <a:t>http</a:t>
+            </a:r>
+            <a:r>
+              <a:rPr lang="en-US" b="1" dirty="0"/>
+              <a:t>://bit.ly/1L5kIJM</a:t>
+            </a:r>
           </a:p>
         </p:txBody>
       </p:sp>
@@ -7991,6 +8250,43 @@
             <a:r>
               <a:rPr lang="en" sz="1800"/>
               <a:t>...or simply use cloud web interface</a:t>
+            </a:r>
+          </a:p>
+        </p:txBody>
+      </p:sp>
+      <p:sp>
+        <p:nvSpPr>
+          <p:cNvPr id="6" name="TextBox 5"/>
+          <p:cNvSpPr txBox="1"/>
+          <p:nvPr/>
+        </p:nvSpPr>
+        <p:spPr>
+          <a:xfrm>
+            <a:off x="5585953" y="44624"/>
+            <a:ext cx="3666567" cy="369332"/>
+          </a:xfrm>
+          <a:prstGeom prst="rect">
+            <a:avLst/>
+          </a:prstGeom>
+          <a:noFill/>
+        </p:spPr>
+        <p:txBody>
+          <a:bodyPr wrap="square" rtlCol="0">
+            <a:spAutoFit/>
+          </a:bodyPr>
+          <a:lstStyle/>
+          <a:p>
+            <a:r>
+              <a:rPr lang="en-US" dirty="0" smtClean="0"/>
+              <a:t>JET Web App : </a:t>
+            </a:r>
+            <a:r>
+              <a:rPr lang="en-US" b="1" dirty="0" smtClean="0"/>
+              <a:t>http</a:t>
+            </a:r>
+            <a:r>
+              <a:rPr lang="en-US" b="1" dirty="0"/>
+              <a:t>://bit.ly/1L5kIJM</a:t>
             </a:r>
           </a:p>
         </p:txBody>
@@ -33727,6 +34023,43 @@
           </a:ln>
         </p:spPr>
       </p:pic>
+      <p:sp>
+        <p:nvSpPr>
+          <p:cNvPr id="3" name="TextBox 2"/>
+          <p:cNvSpPr txBox="1"/>
+          <p:nvPr/>
+        </p:nvSpPr>
+        <p:spPr>
+          <a:xfrm>
+            <a:off x="5585953" y="44624"/>
+            <a:ext cx="3666567" cy="369332"/>
+          </a:xfrm>
+          <a:prstGeom prst="rect">
+            <a:avLst/>
+          </a:prstGeom>
+          <a:noFill/>
+        </p:spPr>
+        <p:txBody>
+          <a:bodyPr wrap="square" rtlCol="0">
+            <a:spAutoFit/>
+          </a:bodyPr>
+          <a:lstStyle/>
+          <a:p>
+            <a:r>
+              <a:rPr lang="en-US" dirty="0" smtClean="0"/>
+              <a:t>JET Web App : </a:t>
+            </a:r>
+            <a:r>
+              <a:rPr lang="en-US" b="1" dirty="0" smtClean="0"/>
+              <a:t>http</a:t>
+            </a:r>
+            <a:r>
+              <a:rPr lang="en-US" b="1" dirty="0"/>
+              <a:t>://bit.ly/1L5kIJM</a:t>
+            </a:r>
+          </a:p>
+        </p:txBody>
+      </p:sp>
     </p:spTree>
     <p:extLst>
       <p:ext uri="{BB962C8B-B14F-4D97-AF65-F5344CB8AC3E}">

</xml_diff>

<commit_message>
Better BitLy URL for webapp
</commit_message>
<xml_diff>
--- a/soaring-through-the-clouds-ofmw-forum2016-valencia-demo.pptx
+++ b/soaring-through-the-clouds-ofmw-forum2016-valencia-demo.pptx
@@ -4982,14 +4982,14 @@
       </p:sp>
       <p:sp>
         <p:nvSpPr>
-          <p:cNvPr id="8" name="TextBox 7"/>
+          <p:cNvPr id="9" name="TextBox 8"/>
           <p:cNvSpPr txBox="1"/>
           <p:nvPr/>
         </p:nvSpPr>
         <p:spPr>
           <a:xfrm>
-            <a:off x="5585953" y="44624"/>
-            <a:ext cx="3666567" cy="369332"/>
+            <a:off x="5364089" y="44624"/>
+            <a:ext cx="3888432" cy="369332"/>
           </a:xfrm>
           <a:prstGeom prst="rect">
             <a:avLst/>
@@ -5004,16 +5004,21 @@
           <a:p>
             <a:r>
               <a:rPr lang="en-US" dirty="0" smtClean="0"/>
-              <a:t>JET Web App : </a:t>
-            </a:r>
-            <a:r>
-              <a:rPr lang="en-US" b="1" dirty="0" smtClean="0"/>
+              <a:t>JET Web App </a:t>
+            </a:r>
+            <a:r>
+              <a:rPr lang="en-US" dirty="0" smtClean="0"/>
+              <a:t>: </a:t>
+            </a:r>
+            <a:r>
+              <a:rPr lang="en-US" b="1" u="sng" dirty="0" smtClean="0"/>
               <a:t>http</a:t>
             </a:r>
             <a:r>
-              <a:rPr lang="en-US" b="1" dirty="0"/>
-              <a:t>://bit.ly/1L5kIJM</a:t>
-            </a:r>
+              <a:rPr lang="en-US" b="1" u="sng" dirty="0"/>
+              <a:t>://bit.ly/acesdemo</a:t>
+            </a:r>
+            <a:endParaRPr lang="en-US" b="1" dirty="0"/>
           </a:p>
         </p:txBody>
       </p:sp>
@@ -5281,14 +5286,14 @@
       </p:sp>
       <p:sp>
         <p:nvSpPr>
-          <p:cNvPr id="8" name="TextBox 7"/>
+          <p:cNvPr id="9" name="TextBox 8"/>
           <p:cNvSpPr txBox="1"/>
           <p:nvPr/>
         </p:nvSpPr>
         <p:spPr>
           <a:xfrm>
-            <a:off x="5585953" y="44624"/>
-            <a:ext cx="3666567" cy="369332"/>
+            <a:off x="5364089" y="44624"/>
+            <a:ext cx="3888432" cy="369332"/>
           </a:xfrm>
           <a:prstGeom prst="rect">
             <a:avLst/>
@@ -5303,16 +5308,21 @@
           <a:p>
             <a:r>
               <a:rPr lang="en-US" dirty="0" smtClean="0"/>
-              <a:t>JET Web App : </a:t>
-            </a:r>
-            <a:r>
-              <a:rPr lang="en-US" b="1" dirty="0" smtClean="0"/>
+              <a:t>JET Web App </a:t>
+            </a:r>
+            <a:r>
+              <a:rPr lang="en-US" dirty="0" smtClean="0"/>
+              <a:t>: </a:t>
+            </a:r>
+            <a:r>
+              <a:rPr lang="en-US" b="1" u="sng" dirty="0" smtClean="0"/>
               <a:t>http</a:t>
             </a:r>
             <a:r>
-              <a:rPr lang="en-US" b="1" dirty="0"/>
-              <a:t>://bit.ly/1L5kIJM</a:t>
-            </a:r>
+              <a:rPr lang="en-US" b="1" u="sng" dirty="0"/>
+              <a:t>://bit.ly/acesdemo</a:t>
+            </a:r>
+            <a:endParaRPr lang="en-US" b="1" dirty="0"/>
           </a:p>
         </p:txBody>
       </p:sp>
@@ -5647,14 +5657,14 @@
       </p:sp>
       <p:sp>
         <p:nvSpPr>
-          <p:cNvPr id="4" name="TextBox 3"/>
+          <p:cNvPr id="5" name="TextBox 4"/>
           <p:cNvSpPr txBox="1"/>
           <p:nvPr/>
         </p:nvSpPr>
         <p:spPr>
           <a:xfrm>
-            <a:off x="5585953" y="44624"/>
-            <a:ext cx="3666567" cy="369332"/>
+            <a:off x="5364089" y="44624"/>
+            <a:ext cx="3888432" cy="369332"/>
           </a:xfrm>
           <a:prstGeom prst="rect">
             <a:avLst/>
@@ -5669,16 +5679,21 @@
           <a:p>
             <a:r>
               <a:rPr lang="en-US" dirty="0" smtClean="0"/>
-              <a:t>JET Web App : </a:t>
-            </a:r>
-            <a:r>
-              <a:rPr lang="en-US" b="1" dirty="0" smtClean="0"/>
+              <a:t>JET Web App </a:t>
+            </a:r>
+            <a:r>
+              <a:rPr lang="en-US" dirty="0" smtClean="0"/>
+              <a:t>: </a:t>
+            </a:r>
+            <a:r>
+              <a:rPr lang="en-US" b="1" u="sng" dirty="0" smtClean="0"/>
               <a:t>http</a:t>
             </a:r>
             <a:r>
-              <a:rPr lang="en-US" b="1" dirty="0"/>
-              <a:t>://bit.ly/1L5kIJM</a:t>
-            </a:r>
+              <a:rPr lang="en-US" b="1" u="sng" dirty="0"/>
+              <a:t>://bit.ly/acesdemo</a:t>
+            </a:r>
+            <a:endParaRPr lang="en-US" b="1" dirty="0"/>
           </a:p>
         </p:txBody>
       </p:sp>
@@ -6131,14 +6146,14 @@
       </p:sp>
       <p:sp>
         <p:nvSpPr>
-          <p:cNvPr id="4" name="TextBox 3"/>
+          <p:cNvPr id="5" name="TextBox 4"/>
           <p:cNvSpPr txBox="1"/>
           <p:nvPr/>
         </p:nvSpPr>
         <p:spPr>
           <a:xfrm>
-            <a:off x="5585953" y="44624"/>
-            <a:ext cx="3666567" cy="369332"/>
+            <a:off x="5364089" y="44624"/>
+            <a:ext cx="3888432" cy="369332"/>
           </a:xfrm>
           <a:prstGeom prst="rect">
             <a:avLst/>
@@ -6153,16 +6168,21 @@
           <a:p>
             <a:r>
               <a:rPr lang="en-US" dirty="0" smtClean="0"/>
-              <a:t>JET Web App : </a:t>
-            </a:r>
-            <a:r>
-              <a:rPr lang="en-US" b="1" dirty="0" smtClean="0"/>
+              <a:t>JET Web App </a:t>
+            </a:r>
+            <a:r>
+              <a:rPr lang="en-US" dirty="0" smtClean="0"/>
+              <a:t>: </a:t>
+            </a:r>
+            <a:r>
+              <a:rPr lang="en-US" b="1" u="sng" dirty="0" smtClean="0"/>
               <a:t>http</a:t>
             </a:r>
             <a:r>
-              <a:rPr lang="en-US" b="1" dirty="0"/>
-              <a:t>://bit.ly/1L5kIJM</a:t>
-            </a:r>
+              <a:rPr lang="en-US" b="1" u="sng" dirty="0"/>
+              <a:t>://bit.ly/acesdemo</a:t>
+            </a:r>
+            <a:endParaRPr lang="en-US" b="1" dirty="0"/>
           </a:p>
         </p:txBody>
       </p:sp>
@@ -6561,14 +6581,14 @@
       </p:sp>
       <p:sp>
         <p:nvSpPr>
-          <p:cNvPr id="9" name="TextBox 8"/>
+          <p:cNvPr id="10" name="TextBox 9"/>
           <p:cNvSpPr txBox="1"/>
           <p:nvPr/>
         </p:nvSpPr>
         <p:spPr>
           <a:xfrm>
-            <a:off x="5585953" y="44624"/>
-            <a:ext cx="3666567" cy="369332"/>
+            <a:off x="5364089" y="44624"/>
+            <a:ext cx="3888432" cy="369332"/>
           </a:xfrm>
           <a:prstGeom prst="rect">
             <a:avLst/>
@@ -6583,16 +6603,21 @@
           <a:p>
             <a:r>
               <a:rPr lang="en-US" dirty="0" smtClean="0"/>
-              <a:t>JET Web App : </a:t>
-            </a:r>
-            <a:r>
-              <a:rPr lang="en-US" b="1" dirty="0" smtClean="0"/>
+              <a:t>JET Web App </a:t>
+            </a:r>
+            <a:r>
+              <a:rPr lang="en-US" dirty="0" smtClean="0"/>
+              <a:t>: </a:t>
+            </a:r>
+            <a:r>
+              <a:rPr lang="en-US" b="1" u="sng" dirty="0" smtClean="0"/>
               <a:t>http</a:t>
             </a:r>
             <a:r>
-              <a:rPr lang="en-US" b="1" dirty="0"/>
-              <a:t>://bit.ly/1L5kIJM</a:t>
-            </a:r>
+              <a:rPr lang="en-US" b="1" u="sng" dirty="0"/>
+              <a:t>://bit.ly/acesdemo</a:t>
+            </a:r>
+            <a:endParaRPr lang="en-US" b="1" dirty="0"/>
           </a:p>
         </p:txBody>
       </p:sp>
@@ -7257,14 +7282,14 @@
       </p:sp>
       <p:sp>
         <p:nvSpPr>
-          <p:cNvPr id="9" name="TextBox 8"/>
+          <p:cNvPr id="10" name="TextBox 9"/>
           <p:cNvSpPr txBox="1"/>
           <p:nvPr/>
         </p:nvSpPr>
         <p:spPr>
           <a:xfrm>
-            <a:off x="5585953" y="44624"/>
-            <a:ext cx="3666567" cy="369332"/>
+            <a:off x="5364089" y="44624"/>
+            <a:ext cx="3888432" cy="369332"/>
           </a:xfrm>
           <a:prstGeom prst="rect">
             <a:avLst/>
@@ -7279,16 +7304,21 @@
           <a:p>
             <a:r>
               <a:rPr lang="en-US" dirty="0" smtClean="0"/>
-              <a:t>JET Web App : </a:t>
-            </a:r>
-            <a:r>
-              <a:rPr lang="en-US" b="1" dirty="0" smtClean="0"/>
+              <a:t>JET Web App </a:t>
+            </a:r>
+            <a:r>
+              <a:rPr lang="en-US" dirty="0" smtClean="0"/>
+              <a:t>: </a:t>
+            </a:r>
+            <a:r>
+              <a:rPr lang="en-US" b="1" u="sng" dirty="0" smtClean="0"/>
               <a:t>http</a:t>
             </a:r>
             <a:r>
-              <a:rPr lang="en-US" b="1" dirty="0"/>
-              <a:t>://bit.ly/1L5kIJM</a:t>
-            </a:r>
+              <a:rPr lang="en-US" b="1" u="sng" dirty="0"/>
+              <a:t>://bit.ly/acesdemo</a:t>
+            </a:r>
+            <a:endParaRPr lang="en-US" b="1" dirty="0"/>
           </a:p>
         </p:txBody>
       </p:sp>
@@ -7763,14 +7793,14 @@
       </p:sp>
       <p:sp>
         <p:nvSpPr>
-          <p:cNvPr id="4" name="TextBox 3"/>
+          <p:cNvPr id="5" name="TextBox 4"/>
           <p:cNvSpPr txBox="1"/>
           <p:nvPr/>
         </p:nvSpPr>
         <p:spPr>
           <a:xfrm>
-            <a:off x="5585953" y="44624"/>
-            <a:ext cx="3666567" cy="369332"/>
+            <a:off x="5364089" y="44624"/>
+            <a:ext cx="3888432" cy="369332"/>
           </a:xfrm>
           <a:prstGeom prst="rect">
             <a:avLst/>
@@ -7785,16 +7815,21 @@
           <a:p>
             <a:r>
               <a:rPr lang="en-US" dirty="0" smtClean="0"/>
-              <a:t>JET Web App : </a:t>
-            </a:r>
-            <a:r>
-              <a:rPr lang="en-US" b="1" dirty="0" smtClean="0"/>
+              <a:t>JET Web App </a:t>
+            </a:r>
+            <a:r>
+              <a:rPr lang="en-US" dirty="0" smtClean="0"/>
+              <a:t>: </a:t>
+            </a:r>
+            <a:r>
+              <a:rPr lang="en-US" b="1" u="sng" dirty="0" smtClean="0"/>
               <a:t>http</a:t>
             </a:r>
             <a:r>
-              <a:rPr lang="en-US" b="1" dirty="0"/>
-              <a:t>://bit.ly/1L5kIJM</a:t>
-            </a:r>
+              <a:rPr lang="en-US" b="1" u="sng" dirty="0"/>
+              <a:t>://bit.ly/acesdemo</a:t>
+            </a:r>
+            <a:endParaRPr lang="en-US" b="1" dirty="0"/>
           </a:p>
         </p:txBody>
       </p:sp>
@@ -8256,14 +8291,14 @@
       </p:sp>
       <p:sp>
         <p:nvSpPr>
-          <p:cNvPr id="6" name="TextBox 5"/>
+          <p:cNvPr id="7" name="TextBox 6"/>
           <p:cNvSpPr txBox="1"/>
           <p:nvPr/>
         </p:nvSpPr>
         <p:spPr>
           <a:xfrm>
-            <a:off x="5585953" y="44624"/>
-            <a:ext cx="3666567" cy="369332"/>
+            <a:off x="5364089" y="44624"/>
+            <a:ext cx="3888432" cy="369332"/>
           </a:xfrm>
           <a:prstGeom prst="rect">
             <a:avLst/>
@@ -8278,16 +8313,21 @@
           <a:p>
             <a:r>
               <a:rPr lang="en-US" dirty="0" smtClean="0"/>
-              <a:t>JET Web App : </a:t>
-            </a:r>
-            <a:r>
-              <a:rPr lang="en-US" b="1" dirty="0" smtClean="0"/>
+              <a:t>JET Web App </a:t>
+            </a:r>
+            <a:r>
+              <a:rPr lang="en-US" dirty="0" smtClean="0"/>
+              <a:t>: </a:t>
+            </a:r>
+            <a:r>
+              <a:rPr lang="en-US" b="1" u="sng" dirty="0" smtClean="0"/>
               <a:t>http</a:t>
             </a:r>
             <a:r>
-              <a:rPr lang="en-US" b="1" dirty="0"/>
-              <a:t>://bit.ly/1L5kIJM</a:t>
-            </a:r>
+              <a:rPr lang="en-US" b="1" u="sng" dirty="0"/>
+              <a:t>://bit.ly/acesdemo</a:t>
+            </a:r>
+            <a:endParaRPr lang="en-US" b="1" dirty="0"/>
           </a:p>
         </p:txBody>
       </p:sp>
@@ -34031,8 +34071,8 @@
         </p:nvSpPr>
         <p:spPr>
           <a:xfrm>
-            <a:off x="5585953" y="44624"/>
-            <a:ext cx="3666567" cy="369332"/>
+            <a:off x="5364089" y="44624"/>
+            <a:ext cx="3888432" cy="369332"/>
           </a:xfrm>
           <a:prstGeom prst="rect">
             <a:avLst/>
@@ -34047,16 +34087,21 @@
           <a:p>
             <a:r>
               <a:rPr lang="en-US" dirty="0" smtClean="0"/>
-              <a:t>JET Web App : </a:t>
-            </a:r>
-            <a:r>
-              <a:rPr lang="en-US" b="1" dirty="0" smtClean="0"/>
+              <a:t>JET Web App </a:t>
+            </a:r>
+            <a:r>
+              <a:rPr lang="en-US" dirty="0" smtClean="0"/>
+              <a:t>: </a:t>
+            </a:r>
+            <a:r>
+              <a:rPr lang="en-US" b="1" u="sng" dirty="0" smtClean="0"/>
               <a:t>http</a:t>
             </a:r>
             <a:r>
-              <a:rPr lang="en-US" b="1" dirty="0"/>
-              <a:t>://bit.ly/1L5kIJM</a:t>
-            </a:r>
+              <a:rPr lang="en-US" b="1" u="sng" dirty="0"/>
+              <a:t>://bit.ly/acesdemo</a:t>
+            </a:r>
+            <a:endParaRPr lang="en-US" b="1" dirty="0"/>
           </a:p>
         </p:txBody>
       </p:sp>

</xml_diff>

<commit_message>
added url for Mark
</commit_message>
<xml_diff>
--- a/soaring-through-the-clouds-ofmw-forum2016-valencia-demo.pptx
+++ b/soaring-through-the-clouds-ofmw-forum2016-valencia-demo.pptx
@@ -372,7 +372,7 @@
           <a:p>
             <a:fld id="{CC738180-432E-4756-92F1-B5F27E324F80}" type="slidenum">
               <a:rPr lang="en-US" smtClean="0"/>
-              <a:t>‹#›</a:t>
+              <a:t>‹Nr.›</a:t>
             </a:fld>
             <a:endParaRPr lang="en-US"/>
           </a:p>
@@ -1613,7 +1613,7 @@
           <a:p>
             <a:fld id="{2011593E-1E57-4F1C-B99A-6F0ED68FB12A}" type="slidenum">
               <a:rPr lang="en-US" smtClean="0"/>
-              <a:t>‹#›</a:t>
+              <a:t>‹Nr.›</a:t>
             </a:fld>
             <a:endParaRPr lang="en-US"/>
           </a:p>
@@ -1783,7 +1783,7 @@
           <a:p>
             <a:fld id="{2011593E-1E57-4F1C-B99A-6F0ED68FB12A}" type="slidenum">
               <a:rPr lang="en-US" smtClean="0"/>
-              <a:t>‹#›</a:t>
+              <a:t>‹Nr.›</a:t>
             </a:fld>
             <a:endParaRPr lang="en-US"/>
           </a:p>
@@ -1963,7 +1963,7 @@
           <a:p>
             <a:fld id="{2011593E-1E57-4F1C-B99A-6F0ED68FB12A}" type="slidenum">
               <a:rPr lang="en-US" smtClean="0"/>
-              <a:t>‹#›</a:t>
+              <a:t>‹Nr.›</a:t>
             </a:fld>
             <a:endParaRPr lang="en-US"/>
           </a:p>
@@ -2196,7 +2196,7 @@
             </a:pPr>
             <a:fld id="{00000000-1234-1234-1234-123412341234}" type="slidenum">
               <a:rPr lang="en"/>
-              <a:t>‹#›</a:t>
+              <a:t>‹Nr.›</a:t>
             </a:fld>
             <a:endParaRPr lang="en"/>
           </a:p>
@@ -2366,7 +2366,7 @@
           <a:p>
             <a:fld id="{2011593E-1E57-4F1C-B99A-6F0ED68FB12A}" type="slidenum">
               <a:rPr lang="en-US" smtClean="0"/>
-              <a:t>‹#›</a:t>
+              <a:t>‹Nr.›</a:t>
             </a:fld>
             <a:endParaRPr lang="en-US"/>
           </a:p>
@@ -2612,7 +2612,7 @@
           <a:p>
             <a:fld id="{2011593E-1E57-4F1C-B99A-6F0ED68FB12A}" type="slidenum">
               <a:rPr lang="en-US" smtClean="0"/>
-              <a:t>‹#›</a:t>
+              <a:t>‹Nr.›</a:t>
             </a:fld>
             <a:endParaRPr lang="en-US"/>
           </a:p>
@@ -2900,7 +2900,7 @@
           <a:p>
             <a:fld id="{2011593E-1E57-4F1C-B99A-6F0ED68FB12A}" type="slidenum">
               <a:rPr lang="en-US" smtClean="0"/>
-              <a:t>‹#›</a:t>
+              <a:t>‹Nr.›</a:t>
             </a:fld>
             <a:endParaRPr lang="en-US"/>
           </a:p>
@@ -3322,7 +3322,7 @@
           <a:p>
             <a:fld id="{2011593E-1E57-4F1C-B99A-6F0ED68FB12A}" type="slidenum">
               <a:rPr lang="en-US" smtClean="0"/>
-              <a:t>‹#›</a:t>
+              <a:t>‹Nr.›</a:t>
             </a:fld>
             <a:endParaRPr lang="en-US"/>
           </a:p>
@@ -3440,7 +3440,7 @@
           <a:p>
             <a:fld id="{2011593E-1E57-4F1C-B99A-6F0ED68FB12A}" type="slidenum">
               <a:rPr lang="en-US" smtClean="0"/>
-              <a:t>‹#›</a:t>
+              <a:t>‹Nr.›</a:t>
             </a:fld>
             <a:endParaRPr lang="en-US"/>
           </a:p>
@@ -3535,7 +3535,7 @@
           <a:p>
             <a:fld id="{2011593E-1E57-4F1C-B99A-6F0ED68FB12A}" type="slidenum">
               <a:rPr lang="en-US" smtClean="0"/>
-              <a:t>‹#›</a:t>
+              <a:t>‹Nr.›</a:t>
             </a:fld>
             <a:endParaRPr lang="en-US"/>
           </a:p>
@@ -3812,7 +3812,7 @@
           <a:p>
             <a:fld id="{2011593E-1E57-4F1C-B99A-6F0ED68FB12A}" type="slidenum">
               <a:rPr lang="en-US" smtClean="0"/>
-              <a:t>‹#›</a:t>
+              <a:t>‹Nr.›</a:t>
             </a:fld>
             <a:endParaRPr lang="en-US"/>
           </a:p>
@@ -4065,7 +4065,7 @@
           <a:p>
             <a:fld id="{2011593E-1E57-4F1C-B99A-6F0ED68FB12A}" type="slidenum">
               <a:rPr lang="en-US" smtClean="0"/>
-              <a:t>‹#›</a:t>
+              <a:t>‹Nr.›</a:t>
             </a:fld>
             <a:endParaRPr lang="en-US"/>
           </a:p>
@@ -4314,7 +4314,7 @@
           <a:p>
             <a:fld id="{2011593E-1E57-4F1C-B99A-6F0ED68FB12A}" type="slidenum">
               <a:rPr lang="en-US" smtClean="0"/>
-              <a:t>‹#›</a:t>
+              <a:t>‹Nr.›</a:t>
             </a:fld>
             <a:endParaRPr lang="en-US"/>
           </a:p>
@@ -13443,6 +13443,43 @@
               <a:t>Social Network used to discuss the marketing image, description and approval</a:t>
             </a:r>
             <a:endParaRPr lang="en-US" sz="1400" dirty="0"/>
+          </a:p>
+        </p:txBody>
+      </p:sp>
+      <p:sp>
+        <p:nvSpPr>
+          <p:cNvPr id="21" name="Rechteck 20"/>
+          <p:cNvSpPr/>
+          <p:nvPr/>
+        </p:nvSpPr>
+        <p:spPr>
+          <a:xfrm>
+            <a:off x="5220072" y="12036"/>
+            <a:ext cx="3952429" cy="369332"/>
+          </a:xfrm>
+          <a:prstGeom prst="rect">
+            <a:avLst/>
+          </a:prstGeom>
+        </p:spPr>
+        <p:txBody>
+          <a:bodyPr wrap="none">
+            <a:spAutoFit/>
+          </a:bodyPr>
+          <a:lstStyle/>
+          <a:p>
+            <a:r>
+              <a:rPr lang="en-GB" u="sng" dirty="0" smtClean="0">
+                <a:hlinkClick r:id="rId6"/>
+              </a:rPr>
+              <a:t>Microsites: http</a:t>
+            </a:r>
+            <a:r>
+              <a:rPr lang="en-GB" u="sng" dirty="0">
+                <a:hlinkClick r:id="rId6"/>
+              </a:rPr>
+              <a:t>://tinyurl.com/ACED-KW</a:t>
+            </a:r>
+            <a:endParaRPr lang="de-DE" dirty="0"/>
           </a:p>
         </p:txBody>
       </p:sp>

</xml_diff>

<commit_message>
Removed JCS from under ACC;
</commit_message>
<xml_diff>
--- a/soaring-through-the-clouds-ofmw-forum2016-valencia-demo.pptx
+++ b/soaring-through-the-clouds-ofmw-forum2016-valencia-demo.pptx
@@ -13,9 +13,9 @@
     <p:sldId id="266" r:id="rId4"/>
     <p:sldId id="267" r:id="rId5"/>
     <p:sldId id="269" r:id="rId6"/>
-    <p:sldId id="268" r:id="rId7"/>
+    <p:sldId id="285" r:id="rId7"/>
     <p:sldId id="261" r:id="rId8"/>
-    <p:sldId id="270" r:id="rId9"/>
+    <p:sldId id="286" r:id="rId9"/>
     <p:sldId id="275" r:id="rId10"/>
     <p:sldId id="276" r:id="rId11"/>
     <p:sldId id="277" r:id="rId12"/>
@@ -372,7 +372,7 @@
           <a:p>
             <a:fld id="{CC738180-432E-4756-92F1-B5F27E324F80}" type="slidenum">
               <a:rPr lang="en-US" smtClean="0"/>
-              <a:t>‹Nr.›</a:t>
+              <a:t>‹#›</a:t>
             </a:fld>
             <a:endParaRPr lang="en-US"/>
           </a:p>
@@ -1613,7 +1613,7 @@
           <a:p>
             <a:fld id="{2011593E-1E57-4F1C-B99A-6F0ED68FB12A}" type="slidenum">
               <a:rPr lang="en-US" smtClean="0"/>
-              <a:t>‹Nr.›</a:t>
+              <a:t>‹#›</a:t>
             </a:fld>
             <a:endParaRPr lang="en-US"/>
           </a:p>
@@ -1783,7 +1783,7 @@
           <a:p>
             <a:fld id="{2011593E-1E57-4F1C-B99A-6F0ED68FB12A}" type="slidenum">
               <a:rPr lang="en-US" smtClean="0"/>
-              <a:t>‹Nr.›</a:t>
+              <a:t>‹#›</a:t>
             </a:fld>
             <a:endParaRPr lang="en-US"/>
           </a:p>
@@ -1963,7 +1963,7 @@
           <a:p>
             <a:fld id="{2011593E-1E57-4F1C-B99A-6F0ED68FB12A}" type="slidenum">
               <a:rPr lang="en-US" smtClean="0"/>
-              <a:t>‹Nr.›</a:t>
+              <a:t>‹#›</a:t>
             </a:fld>
             <a:endParaRPr lang="en-US"/>
           </a:p>
@@ -2196,7 +2196,7 @@
             </a:pPr>
             <a:fld id="{00000000-1234-1234-1234-123412341234}" type="slidenum">
               <a:rPr lang="en"/>
-              <a:t>‹Nr.›</a:t>
+              <a:t>‹#›</a:t>
             </a:fld>
             <a:endParaRPr lang="en"/>
           </a:p>
@@ -2366,7 +2366,7 @@
           <a:p>
             <a:fld id="{2011593E-1E57-4F1C-B99A-6F0ED68FB12A}" type="slidenum">
               <a:rPr lang="en-US" smtClean="0"/>
-              <a:t>‹Nr.›</a:t>
+              <a:t>‹#›</a:t>
             </a:fld>
             <a:endParaRPr lang="en-US"/>
           </a:p>
@@ -2612,7 +2612,7 @@
           <a:p>
             <a:fld id="{2011593E-1E57-4F1C-B99A-6F0ED68FB12A}" type="slidenum">
               <a:rPr lang="en-US" smtClean="0"/>
-              <a:t>‹Nr.›</a:t>
+              <a:t>‹#›</a:t>
             </a:fld>
             <a:endParaRPr lang="en-US"/>
           </a:p>
@@ -2900,7 +2900,7 @@
           <a:p>
             <a:fld id="{2011593E-1E57-4F1C-B99A-6F0ED68FB12A}" type="slidenum">
               <a:rPr lang="en-US" smtClean="0"/>
-              <a:t>‹Nr.›</a:t>
+              <a:t>‹#›</a:t>
             </a:fld>
             <a:endParaRPr lang="en-US"/>
           </a:p>
@@ -3322,7 +3322,7 @@
           <a:p>
             <a:fld id="{2011593E-1E57-4F1C-B99A-6F0ED68FB12A}" type="slidenum">
               <a:rPr lang="en-US" smtClean="0"/>
-              <a:t>‹Nr.›</a:t>
+              <a:t>‹#›</a:t>
             </a:fld>
             <a:endParaRPr lang="en-US"/>
           </a:p>
@@ -3440,7 +3440,7 @@
           <a:p>
             <a:fld id="{2011593E-1E57-4F1C-B99A-6F0ED68FB12A}" type="slidenum">
               <a:rPr lang="en-US" smtClean="0"/>
-              <a:t>‹Nr.›</a:t>
+              <a:t>‹#›</a:t>
             </a:fld>
             <a:endParaRPr lang="en-US"/>
           </a:p>
@@ -3535,7 +3535,7 @@
           <a:p>
             <a:fld id="{2011593E-1E57-4F1C-B99A-6F0ED68FB12A}" type="slidenum">
               <a:rPr lang="en-US" smtClean="0"/>
-              <a:t>‹Nr.›</a:t>
+              <a:t>‹#›</a:t>
             </a:fld>
             <a:endParaRPr lang="en-US"/>
           </a:p>
@@ -3812,7 +3812,7 @@
           <a:p>
             <a:fld id="{2011593E-1E57-4F1C-B99A-6F0ED68FB12A}" type="slidenum">
               <a:rPr lang="en-US" smtClean="0"/>
-              <a:t>‹Nr.›</a:t>
+              <a:t>‹#›</a:t>
             </a:fld>
             <a:endParaRPr lang="en-US"/>
           </a:p>
@@ -4065,7 +4065,7 @@
           <a:p>
             <a:fld id="{2011593E-1E57-4F1C-B99A-6F0ED68FB12A}" type="slidenum">
               <a:rPr lang="en-US" smtClean="0"/>
-              <a:t>‹Nr.›</a:t>
+              <a:t>‹#›</a:t>
             </a:fld>
             <a:endParaRPr lang="en-US"/>
           </a:p>
@@ -4314,7 +4314,7 @@
           <a:p>
             <a:fld id="{2011593E-1E57-4F1C-B99A-6F0ED68FB12A}" type="slidenum">
               <a:rPr lang="en-US" smtClean="0"/>
-              <a:t>‹Nr.›</a:t>
+              <a:t>‹#›</a:t>
             </a:fld>
             <a:endParaRPr lang="en-US"/>
           </a:p>
@@ -14047,43 +14047,6 @@
           </a:extLst>
         </p:spPr>
       </p:pic>
-      <p:sp>
-        <p:nvSpPr>
-          <p:cNvPr id="4" name="TextBox 3"/>
-          <p:cNvSpPr txBox="1"/>
-          <p:nvPr/>
-        </p:nvSpPr>
-        <p:spPr>
-          <a:xfrm>
-            <a:off x="5585953" y="44624"/>
-            <a:ext cx="3666567" cy="369332"/>
-          </a:xfrm>
-          <a:prstGeom prst="rect">
-            <a:avLst/>
-          </a:prstGeom>
-          <a:noFill/>
-        </p:spPr>
-        <p:txBody>
-          <a:bodyPr wrap="square" rtlCol="0">
-            <a:spAutoFit/>
-          </a:bodyPr>
-          <a:lstStyle/>
-          <a:p>
-            <a:r>
-              <a:rPr lang="en-US" dirty="0" smtClean="0"/>
-              <a:t>JET Web App : </a:t>
-            </a:r>
-            <a:r>
-              <a:rPr lang="en-US" b="1" dirty="0" smtClean="0"/>
-              <a:t>http</a:t>
-            </a:r>
-            <a:r>
-              <a:rPr lang="en-US" b="1" dirty="0"/>
-              <a:t>://bit.ly/1L5kIJM</a:t>
-            </a:r>
-          </a:p>
-        </p:txBody>
-      </p:sp>
       <p:pic>
         <p:nvPicPr>
           <p:cNvPr id="15" name="Picture 2" descr="https://g.twimg.com/Twitter_logo_blue.png"/>
@@ -14125,6 +14088,44 @@
           </a:extLst>
         </p:spPr>
       </p:pic>
+      <p:sp>
+        <p:nvSpPr>
+          <p:cNvPr id="14" name="TextBox 13"/>
+          <p:cNvSpPr txBox="1"/>
+          <p:nvPr/>
+        </p:nvSpPr>
+        <p:spPr>
+          <a:xfrm>
+            <a:off x="5364089" y="44624"/>
+            <a:ext cx="3888432" cy="369332"/>
+          </a:xfrm>
+          <a:prstGeom prst="rect">
+            <a:avLst/>
+          </a:prstGeom>
+          <a:noFill/>
+        </p:spPr>
+        <p:txBody>
+          <a:bodyPr wrap="square" rtlCol="0">
+            <a:spAutoFit/>
+          </a:bodyPr>
+          <a:lstStyle/>
+          <a:p>
+            <a:r>
+              <a:rPr lang="en-US" dirty="0" smtClean="0"/>
+              <a:t>JET Web App : </a:t>
+            </a:r>
+            <a:r>
+              <a:rPr lang="en-US" b="1" u="sng" dirty="0" smtClean="0"/>
+              <a:t>http</a:t>
+            </a:r>
+            <a:r>
+              <a:rPr lang="en-US" b="1" u="sng" dirty="0"/>
+              <a:t>://bit.ly/acesdemo</a:t>
+            </a:r>
+            <a:endParaRPr lang="en-US" b="1" dirty="0"/>
+          </a:p>
+        </p:txBody>
+      </p:sp>
     </p:spTree>
     <p:extLst>
       <p:ext uri="{BB962C8B-B14F-4D97-AF65-F5344CB8AC3E}">
@@ -27798,7 +27799,8 @@
               <a:rPr lang="nl-NL" sz="1100" dirty="0" smtClean="0">
                 <a:solidFill>
                   <a:schemeClr val="accent2">
-                    <a:lumMod val="75000"/>
+                    <a:lumMod val="60000"/>
+                    <a:lumOff val="40000"/>
                   </a:schemeClr>
                 </a:solidFill>
               </a:rPr>
@@ -27807,7 +27809,8 @@
             <a:endParaRPr lang="en-US" sz="1100" dirty="0">
               <a:solidFill>
                 <a:schemeClr val="accent2">
-                  <a:lumMod val="75000"/>
+                  <a:lumMod val="60000"/>
+                  <a:lumOff val="40000"/>
                 </a:schemeClr>
               </a:solidFill>
             </a:endParaRPr>
@@ -27852,7 +27855,8 @@
               <a:rPr lang="nl-NL" sz="1100" dirty="0" err="1" smtClean="0">
                 <a:solidFill>
                   <a:schemeClr val="accent2">
-                    <a:lumMod val="75000"/>
+                    <a:lumMod val="60000"/>
+                    <a:lumOff val="40000"/>
                   </a:schemeClr>
                 </a:solidFill>
               </a:rPr>
@@ -27861,7 +27865,8 @@
             <a:endParaRPr lang="en-US" sz="1100" dirty="0">
               <a:solidFill>
                 <a:schemeClr val="accent2">
-                  <a:lumMod val="75000"/>
+                  <a:lumMod val="60000"/>
+                  <a:lumOff val="40000"/>
                 </a:schemeClr>
               </a:solidFill>
             </a:endParaRPr>
@@ -27870,14 +27875,56 @@
       </p:sp>
       <p:sp>
         <p:nvSpPr>
-          <p:cNvPr id="14" name="Cube 13"/>
+          <p:cNvPr id="15" name="Cube 14"/>
           <p:cNvSpPr/>
           <p:nvPr/>
         </p:nvSpPr>
         <p:spPr>
           <a:xfrm>
-            <a:off x="6175737" y="2406997"/>
+            <a:off x="6175737" y="2408081"/>
             <a:ext cx="999158" cy="545196"/>
+          </a:xfrm>
+          <a:prstGeom prst="cube">
+            <a:avLst/>
+          </a:prstGeom>
+        </p:spPr>
+        <p:style>
+          <a:lnRef idx="1">
+            <a:schemeClr val="accent2"/>
+          </a:lnRef>
+          <a:fillRef idx="3">
+            <a:schemeClr val="accent2"/>
+          </a:fillRef>
+          <a:effectRef idx="2">
+            <a:schemeClr val="accent2"/>
+          </a:effectRef>
+          <a:fontRef idx="minor">
+            <a:schemeClr val="lt1"/>
+          </a:fontRef>
+        </p:style>
+        <p:txBody>
+          <a:bodyPr rtlCol="0" anchor="ctr"/>
+          <a:lstStyle/>
+          <a:p>
+            <a:pPr algn="ctr"/>
+            <a:r>
+              <a:rPr lang="nl-NL" sz="1400" dirty="0" smtClean="0"/>
+              <a:t>ACC</a:t>
+            </a:r>
+            <a:endParaRPr lang="en-US" sz="1400" dirty="0"/>
+          </a:p>
+        </p:txBody>
+      </p:sp>
+      <p:sp>
+        <p:nvSpPr>
+          <p:cNvPr id="16" name="Cube 15"/>
+          <p:cNvSpPr/>
+          <p:nvPr/>
+        </p:nvSpPr>
+        <p:spPr>
+          <a:xfrm>
+            <a:off x="3606474" y="2702175"/>
+            <a:ext cx="1070526" cy="1619988"/>
           </a:xfrm>
           <a:prstGeom prst="cube">
             <a:avLst/>
@@ -27902,16 +27949,6 @@
           <a:lstStyle/>
           <a:p>
             <a:pPr algn="ctr"/>
-            <a:r>
-              <a:rPr lang="nl-NL" sz="1100" dirty="0" smtClean="0">
-                <a:solidFill>
-                  <a:schemeClr val="accent2">
-                    <a:lumMod val="75000"/>
-                  </a:schemeClr>
-                </a:solidFill>
-              </a:rPr>
-              <a:t>JCS</a:t>
-            </a:r>
             <a:endParaRPr lang="en-US" sz="1100" dirty="0">
               <a:solidFill>
                 <a:schemeClr val="accent2">
@@ -27924,14 +27961,14 @@
       </p:sp>
       <p:sp>
         <p:nvSpPr>
-          <p:cNvPr id="15" name="Cube 14"/>
+          <p:cNvPr id="17" name="Cube 16"/>
           <p:cNvSpPr/>
           <p:nvPr/>
         </p:nvSpPr>
         <p:spPr>
           <a:xfrm>
-            <a:off x="6175737" y="1970841"/>
-            <a:ext cx="999158" cy="545196"/>
+            <a:off x="3677843" y="2320538"/>
+            <a:ext cx="927789" cy="545196"/>
           </a:xfrm>
           <a:prstGeom prst="cube">
             <a:avLst/>
@@ -27958,7 +27995,7 @@
             <a:pPr algn="ctr"/>
             <a:r>
               <a:rPr lang="nl-NL" sz="1400" dirty="0" smtClean="0"/>
-              <a:t>ACC</a:t>
+              <a:t>ICS</a:t>
             </a:r>
             <a:endParaRPr lang="en-US" sz="1400" dirty="0"/>
           </a:p>
@@ -27966,13 +28003,13 @@
       </p:sp>
       <p:sp>
         <p:nvSpPr>
-          <p:cNvPr id="16" name="Cube 15"/>
+          <p:cNvPr id="18" name="Cube 17"/>
           <p:cNvSpPr/>
           <p:nvPr/>
         </p:nvSpPr>
         <p:spPr>
           <a:xfrm>
-            <a:off x="3606474" y="2702175"/>
+            <a:off x="6142938" y="5003374"/>
             <a:ext cx="1070526" cy="1619988"/>
           </a:xfrm>
           <a:prstGeom prst="cube">
@@ -28010,13 +28047,13 @@
       </p:sp>
       <p:sp>
         <p:nvSpPr>
-          <p:cNvPr id="17" name="Cube 16"/>
+          <p:cNvPr id="19" name="Cube 18"/>
           <p:cNvSpPr/>
           <p:nvPr/>
         </p:nvSpPr>
         <p:spPr>
           <a:xfrm>
-            <a:off x="3677843" y="2320538"/>
+            <a:off x="6214307" y="4621738"/>
             <a:ext cx="927789" cy="545196"/>
           </a:xfrm>
           <a:prstGeom prst="cube">
@@ -28043,8 +28080,12 @@
           <a:p>
             <a:pPr algn="ctr"/>
             <a:r>
+              <a:rPr lang="nl-NL" sz="1400" dirty="0"/>
+              <a:t>M</a:t>
+            </a:r>
+            <a:r>
               <a:rPr lang="nl-NL" sz="1400" dirty="0" smtClean="0"/>
-              <a:t>ICS</a:t>
+              <a:t>CS</a:t>
             </a:r>
             <a:endParaRPr lang="en-US" sz="1400" dirty="0"/>
           </a:p>
@@ -28052,13 +28093,13 @@
       </p:sp>
       <p:sp>
         <p:nvSpPr>
-          <p:cNvPr id="18" name="Cube 17"/>
+          <p:cNvPr id="20" name="Cube 19"/>
           <p:cNvSpPr/>
           <p:nvPr/>
         </p:nvSpPr>
         <p:spPr>
           <a:xfrm>
-            <a:off x="6142938" y="5003374"/>
+            <a:off x="323528" y="4402232"/>
             <a:ext cx="1070526" cy="1619988"/>
           </a:xfrm>
           <a:prstGeom prst="cube">
@@ -28096,13 +28137,13 @@
       </p:sp>
       <p:sp>
         <p:nvSpPr>
-          <p:cNvPr id="19" name="Cube 18"/>
+          <p:cNvPr id="21" name="Cube 20"/>
           <p:cNvSpPr/>
           <p:nvPr/>
         </p:nvSpPr>
         <p:spPr>
           <a:xfrm>
-            <a:off x="6214307" y="4621738"/>
+            <a:off x="394897" y="4020595"/>
             <a:ext cx="927789" cy="545196"/>
           </a:xfrm>
           <a:prstGeom prst="cube">
@@ -28129,12 +28170,12 @@
           <a:p>
             <a:pPr algn="ctr"/>
             <a:r>
-              <a:rPr lang="nl-NL" sz="1400" dirty="0"/>
-              <a:t>M</a:t>
+              <a:rPr lang="nl-NL" sz="1400" dirty="0" err="1" smtClean="0"/>
+              <a:t>Doc</a:t>
             </a:r>
             <a:r>
               <a:rPr lang="nl-NL" sz="1400" dirty="0" smtClean="0"/>
-              <a:t>CS</a:t>
+              <a:t> CS</a:t>
             </a:r>
             <a:endParaRPr lang="en-US" sz="1400" dirty="0"/>
           </a:p>
@@ -28142,13 +28183,13 @@
       </p:sp>
       <p:sp>
         <p:nvSpPr>
-          <p:cNvPr id="20" name="Cube 19"/>
+          <p:cNvPr id="22" name="Cube 21"/>
           <p:cNvSpPr/>
           <p:nvPr/>
         </p:nvSpPr>
         <p:spPr>
           <a:xfrm>
-            <a:off x="323528" y="4402232"/>
+            <a:off x="2179106" y="4140028"/>
             <a:ext cx="1070526" cy="1619988"/>
           </a:xfrm>
           <a:prstGeom prst="cube">
@@ -28186,13 +28227,13 @@
       </p:sp>
       <p:sp>
         <p:nvSpPr>
-          <p:cNvPr id="21" name="Cube 20"/>
+          <p:cNvPr id="23" name="Cube 22"/>
           <p:cNvSpPr/>
           <p:nvPr/>
         </p:nvSpPr>
         <p:spPr>
           <a:xfrm>
-            <a:off x="394897" y="4020595"/>
+            <a:off x="2250475" y="3758392"/>
             <a:ext cx="927789" cy="545196"/>
           </a:xfrm>
           <a:prstGeom prst="cube">
@@ -28219,12 +28260,12 @@
           <a:p>
             <a:pPr algn="ctr"/>
             <a:r>
-              <a:rPr lang="nl-NL" sz="1400" dirty="0" err="1" smtClean="0"/>
-              <a:t>Doc</a:t>
+              <a:rPr lang="nl-NL" sz="1400" dirty="0"/>
+              <a:t>P</a:t>
             </a:r>
             <a:r>
               <a:rPr lang="nl-NL" sz="1400" dirty="0" smtClean="0"/>
-              <a:t> CS</a:t>
+              <a:t>CS</a:t>
             </a:r>
             <a:endParaRPr lang="en-US" sz="1400" dirty="0"/>
           </a:p>
@@ -28232,14 +28273,14 @@
       </p:sp>
       <p:sp>
         <p:nvSpPr>
-          <p:cNvPr id="22" name="Cube 21"/>
+          <p:cNvPr id="24" name="Cube 23"/>
           <p:cNvSpPr/>
           <p:nvPr/>
         </p:nvSpPr>
         <p:spPr>
           <a:xfrm>
-            <a:off x="2179106" y="4140028"/>
-            <a:ext cx="1070526" cy="1619988"/>
+            <a:off x="3891948" y="6196173"/>
+            <a:ext cx="999158" cy="545196"/>
           </a:xfrm>
           <a:prstGeom prst="cube">
             <a:avLst/>
@@ -28264,10 +28305,22 @@
           <a:lstStyle/>
           <a:p>
             <a:pPr algn="ctr"/>
+            <a:r>
+              <a:rPr lang="nl-NL" sz="1100" dirty="0" smtClean="0">
+                <a:solidFill>
+                  <a:schemeClr val="accent2">
+                    <a:lumMod val="60000"/>
+                    <a:lumOff val="40000"/>
+                  </a:schemeClr>
+                </a:solidFill>
+              </a:rPr>
+              <a:t>Storage</a:t>
+            </a:r>
             <a:endParaRPr lang="en-US" sz="1100" dirty="0">
               <a:solidFill>
                 <a:schemeClr val="accent2">
-                  <a:lumMod val="75000"/>
+                  <a:lumMod val="60000"/>
+                  <a:lumOff val="40000"/>
                 </a:schemeClr>
               </a:solidFill>
             </a:endParaRPr>
@@ -28276,59 +28329,13 @@
       </p:sp>
       <p:sp>
         <p:nvSpPr>
-          <p:cNvPr id="23" name="Cube 22"/>
+          <p:cNvPr id="25" name="Cube 24"/>
           <p:cNvSpPr/>
           <p:nvPr/>
         </p:nvSpPr>
         <p:spPr>
           <a:xfrm>
-            <a:off x="2250475" y="3758392"/>
-            <a:ext cx="927789" cy="545196"/>
-          </a:xfrm>
-          <a:prstGeom prst="cube">
-            <a:avLst/>
-          </a:prstGeom>
-        </p:spPr>
-        <p:style>
-          <a:lnRef idx="1">
-            <a:schemeClr val="accent2"/>
-          </a:lnRef>
-          <a:fillRef idx="3">
-            <a:schemeClr val="accent2"/>
-          </a:fillRef>
-          <a:effectRef idx="2">
-            <a:schemeClr val="accent2"/>
-          </a:effectRef>
-          <a:fontRef idx="minor">
-            <a:schemeClr val="lt1"/>
-          </a:fontRef>
-        </p:style>
-        <p:txBody>
-          <a:bodyPr rtlCol="0" anchor="ctr"/>
-          <a:lstStyle/>
-          <a:p>
-            <a:pPr algn="ctr"/>
-            <a:r>
-              <a:rPr lang="nl-NL" sz="1400" dirty="0"/>
-              <a:t>P</a:t>
-            </a:r>
-            <a:r>
-              <a:rPr lang="nl-NL" sz="1400" dirty="0" smtClean="0"/>
-              <a:t>CS</a:t>
-            </a:r>
-            <a:endParaRPr lang="en-US" sz="1400" dirty="0"/>
-          </a:p>
-        </p:txBody>
-      </p:sp>
-      <p:sp>
-        <p:nvSpPr>
-          <p:cNvPr id="24" name="Cube 23"/>
-          <p:cNvSpPr/>
-          <p:nvPr/>
-        </p:nvSpPr>
-        <p:spPr>
-          <a:xfrm>
-            <a:off x="3891948" y="6196173"/>
+            <a:off x="3891948" y="5760016"/>
             <a:ext cx="999158" cy="545196"/>
           </a:xfrm>
           <a:prstGeom prst="cube">
@@ -28355,64 +28362,11 @@
           <a:p>
             <a:pPr algn="ctr"/>
             <a:r>
-              <a:rPr lang="nl-NL" sz="1100" dirty="0" smtClean="0">
-                <a:solidFill>
-                  <a:schemeClr val="accent2">
-                    <a:lumMod val="75000"/>
-                  </a:schemeClr>
-                </a:solidFill>
-              </a:rPr>
-              <a:t>Storage</a:t>
-            </a:r>
-            <a:endParaRPr lang="en-US" sz="1100" dirty="0">
-              <a:solidFill>
-                <a:schemeClr val="accent2">
-                  <a:lumMod val="75000"/>
-                </a:schemeClr>
-              </a:solidFill>
-            </a:endParaRPr>
-          </a:p>
-        </p:txBody>
-      </p:sp>
-      <p:sp>
-        <p:nvSpPr>
-          <p:cNvPr id="25" name="Cube 24"/>
-          <p:cNvSpPr/>
-          <p:nvPr/>
-        </p:nvSpPr>
-        <p:spPr>
-          <a:xfrm>
-            <a:off x="3891948" y="5760016"/>
-            <a:ext cx="999158" cy="545196"/>
-          </a:xfrm>
-          <a:prstGeom prst="cube">
-            <a:avLst/>
-          </a:prstGeom>
-        </p:spPr>
-        <p:style>
-          <a:lnRef idx="1">
-            <a:schemeClr val="accent2"/>
-          </a:lnRef>
-          <a:fillRef idx="2">
-            <a:schemeClr val="accent2"/>
-          </a:fillRef>
-          <a:effectRef idx="1">
-            <a:schemeClr val="accent2"/>
-          </a:effectRef>
-          <a:fontRef idx="minor">
-            <a:schemeClr val="dk1"/>
-          </a:fontRef>
-        </p:style>
-        <p:txBody>
-          <a:bodyPr rtlCol="0" anchor="ctr"/>
-          <a:lstStyle/>
-          <a:p>
-            <a:pPr algn="ctr"/>
-            <a:r>
               <a:rPr lang="nl-NL" sz="1100" dirty="0" err="1" smtClean="0">
                 <a:solidFill>
                   <a:schemeClr val="accent2">
-                    <a:lumMod val="75000"/>
+                    <a:lumMod val="60000"/>
+                    <a:lumOff val="40000"/>
                   </a:schemeClr>
                 </a:solidFill>
               </a:rPr>
@@ -28421,61 +28375,8 @@
             <a:endParaRPr lang="en-US" sz="1100" dirty="0">
               <a:solidFill>
                 <a:schemeClr val="accent2">
-                  <a:lumMod val="75000"/>
-                </a:schemeClr>
-              </a:solidFill>
-            </a:endParaRPr>
-          </a:p>
-        </p:txBody>
-      </p:sp>
-      <p:sp>
-        <p:nvSpPr>
-          <p:cNvPr id="26" name="Cube 25"/>
-          <p:cNvSpPr/>
-          <p:nvPr/>
-        </p:nvSpPr>
-        <p:spPr>
-          <a:xfrm>
-            <a:off x="3891948" y="5301208"/>
-            <a:ext cx="999158" cy="545196"/>
-          </a:xfrm>
-          <a:prstGeom prst="cube">
-            <a:avLst/>
-          </a:prstGeom>
-        </p:spPr>
-        <p:style>
-          <a:lnRef idx="1">
-            <a:schemeClr val="accent2"/>
-          </a:lnRef>
-          <a:fillRef idx="2">
-            <a:schemeClr val="accent2"/>
-          </a:fillRef>
-          <a:effectRef idx="1">
-            <a:schemeClr val="accent2"/>
-          </a:effectRef>
-          <a:fontRef idx="minor">
-            <a:schemeClr val="dk1"/>
-          </a:fontRef>
-        </p:style>
-        <p:txBody>
-          <a:bodyPr rtlCol="0" anchor="ctr"/>
-          <a:lstStyle/>
-          <a:p>
-            <a:pPr algn="ctr"/>
-            <a:r>
-              <a:rPr lang="nl-NL" sz="1100" dirty="0">
-                <a:solidFill>
-                  <a:schemeClr val="accent2">
-                    <a:lumMod val="75000"/>
-                  </a:schemeClr>
-                </a:solidFill>
-              </a:rPr>
-              <a:t>JCS</a:t>
-            </a:r>
-            <a:endParaRPr lang="en-US" sz="1100" dirty="0">
-              <a:solidFill>
-                <a:schemeClr val="accent2">
-                  <a:lumMod val="75000"/>
+                  <a:lumMod val="60000"/>
+                  <a:lumOff val="40000"/>
                 </a:schemeClr>
               </a:solidFill>
             </a:endParaRPr>
@@ -28786,7 +28687,7 @@
         </p:nvSpPr>
         <p:spPr>
           <a:xfrm>
-            <a:off x="6568263" y="1911640"/>
+            <a:off x="6568263" y="2348880"/>
             <a:ext cx="214106" cy="163559"/>
           </a:xfrm>
           <a:prstGeom prst="cube">
@@ -29192,8 +29093,8 @@
         </p:nvCxnSpPr>
         <p:spPr>
           <a:xfrm flipV="1">
-            <a:off x="5310394" y="2013865"/>
-            <a:ext cx="1257868" cy="812949"/>
+            <a:off x="5304077" y="2451104"/>
+            <a:ext cx="1264186" cy="375711"/>
           </a:xfrm>
           <a:prstGeom prst="straightConnector1">
             <a:avLst/>
@@ -29355,7 +29256,7 @@
         </p:nvCxnSpPr>
         <p:spPr>
           <a:xfrm flipV="1">
-            <a:off x="4584386" y="4608560"/>
+            <a:off x="4584386" y="5103541"/>
             <a:ext cx="2141571" cy="199015"/>
           </a:xfrm>
           <a:prstGeom prst="straightConnector1">
@@ -29673,7 +29574,7 @@
         </p:nvCxnSpPr>
         <p:spPr>
           <a:xfrm flipV="1">
-            <a:off x="6782368" y="1811824"/>
+            <a:off x="6782368" y="2249064"/>
             <a:ext cx="751553" cy="161152"/>
           </a:xfrm>
           <a:prstGeom prst="straightConnector1">
@@ -30077,7 +29978,7 @@
         </p:nvSpPr>
         <p:spPr>
           <a:xfrm>
-            <a:off x="3891948" y="4828020"/>
+            <a:off x="3891948" y="5323001"/>
             <a:ext cx="999158" cy="545196"/>
           </a:xfrm>
           <a:prstGeom prst="cube">
@@ -30119,7 +30020,7 @@
         </p:nvSpPr>
         <p:spPr>
           <a:xfrm>
-            <a:off x="4370280" y="4746240"/>
+            <a:off x="4370280" y="5241221"/>
             <a:ext cx="214106" cy="163559"/>
           </a:xfrm>
           <a:prstGeom prst="cube">
@@ -30184,7 +30085,7 @@
         </p:blipFill>
         <p:spPr bwMode="auto">
           <a:xfrm>
-            <a:off x="3663927" y="4374179"/>
+            <a:off x="3663927" y="4869160"/>
             <a:ext cx="700116" cy="692134"/>
           </a:xfrm>
           <a:prstGeom prst="rect">
@@ -30205,7 +30106,7 @@
     </p:spTree>
     <p:extLst>
       <p:ext uri="{BB962C8B-B14F-4D97-AF65-F5344CB8AC3E}">
-        <p14:creationId xmlns:p14="http://schemas.microsoft.com/office/powerpoint/2010/main" val="1295006272"/>
+        <p14:creationId xmlns:p14="http://schemas.microsoft.com/office/powerpoint/2010/main" val="3064413594"/>
       </p:ext>
     </p:extLst>
   </p:cSld>
@@ -30596,7 +30497,7 @@
                                           </p:stCondLst>
                                         </p:cTn>
                                         <p:tgtEl>
-                                          <p:spTgt spid="14"/>
+                                          <p:spTgt spid="15"/>
                                         </p:tgtEl>
                                         <p:attrNameLst>
                                           <p:attrName>style.visibility</p:attrName>
@@ -30610,7 +30511,7 @@
                                       <p:cBhvr>
                                         <p:cTn id="37" dur="500"/>
                                         <p:tgtEl>
-                                          <p:spTgt spid="14"/>
+                                          <p:spTgt spid="15"/>
                                         </p:tgtEl>
                                       </p:cBhvr>
                                     </p:animEffect>
@@ -30631,7 +30532,7 @@
                                           </p:stCondLst>
                                         </p:cTn>
                                         <p:tgtEl>
-                                          <p:spTgt spid="15"/>
+                                          <p:spTgt spid="16"/>
                                         </p:tgtEl>
                                         <p:attrNameLst>
                                           <p:attrName>style.visibility</p:attrName>
@@ -30645,7 +30546,7 @@
                                       <p:cBhvr>
                                         <p:cTn id="40" dur="500"/>
                                         <p:tgtEl>
-                                          <p:spTgt spid="15"/>
+                                          <p:spTgt spid="16"/>
                                         </p:tgtEl>
                                       </p:cBhvr>
                                     </p:animEffect>
@@ -30666,7 +30567,7 @@
                                           </p:stCondLst>
                                         </p:cTn>
                                         <p:tgtEl>
-                                          <p:spTgt spid="16"/>
+                                          <p:spTgt spid="17"/>
                                         </p:tgtEl>
                                         <p:attrNameLst>
                                           <p:attrName>style.visibility</p:attrName>
@@ -30680,7 +30581,7 @@
                                       <p:cBhvr>
                                         <p:cTn id="43" dur="500"/>
                                         <p:tgtEl>
-                                          <p:spTgt spid="16"/>
+                                          <p:spTgt spid="17"/>
                                         </p:tgtEl>
                                       </p:cBhvr>
                                     </p:animEffect>
@@ -30701,7 +30602,7 @@
                                           </p:stCondLst>
                                         </p:cTn>
                                         <p:tgtEl>
-                                          <p:spTgt spid="17"/>
+                                          <p:spTgt spid="18"/>
                                         </p:tgtEl>
                                         <p:attrNameLst>
                                           <p:attrName>style.visibility</p:attrName>
@@ -30715,7 +30616,7 @@
                                       <p:cBhvr>
                                         <p:cTn id="46" dur="500"/>
                                         <p:tgtEl>
-                                          <p:spTgt spid="17"/>
+                                          <p:spTgt spid="18"/>
                                         </p:tgtEl>
                                       </p:cBhvr>
                                     </p:animEffect>
@@ -30736,7 +30637,7 @@
                                           </p:stCondLst>
                                         </p:cTn>
                                         <p:tgtEl>
-                                          <p:spTgt spid="18"/>
+                                          <p:spTgt spid="19"/>
                                         </p:tgtEl>
                                         <p:attrNameLst>
                                           <p:attrName>style.visibility</p:attrName>
@@ -30750,7 +30651,7 @@
                                       <p:cBhvr>
                                         <p:cTn id="49" dur="500"/>
                                         <p:tgtEl>
-                                          <p:spTgt spid="18"/>
+                                          <p:spTgt spid="19"/>
                                         </p:tgtEl>
                                       </p:cBhvr>
                                     </p:animEffect>
@@ -30771,7 +30672,7 @@
                                           </p:stCondLst>
                                         </p:cTn>
                                         <p:tgtEl>
-                                          <p:spTgt spid="19"/>
+                                          <p:spTgt spid="20"/>
                                         </p:tgtEl>
                                         <p:attrNameLst>
                                           <p:attrName>style.visibility</p:attrName>
@@ -30785,7 +30686,7 @@
                                       <p:cBhvr>
                                         <p:cTn id="52" dur="500"/>
                                         <p:tgtEl>
-                                          <p:spTgt spid="19"/>
+                                          <p:spTgt spid="20"/>
                                         </p:tgtEl>
                                       </p:cBhvr>
                                     </p:animEffect>
@@ -30806,7 +30707,7 @@
                                           </p:stCondLst>
                                         </p:cTn>
                                         <p:tgtEl>
-                                          <p:spTgt spid="20"/>
+                                          <p:spTgt spid="21"/>
                                         </p:tgtEl>
                                         <p:attrNameLst>
                                           <p:attrName>style.visibility</p:attrName>
@@ -30820,7 +30721,7 @@
                                       <p:cBhvr>
                                         <p:cTn id="55" dur="500"/>
                                         <p:tgtEl>
-                                          <p:spTgt spid="20"/>
+                                          <p:spTgt spid="21"/>
                                         </p:tgtEl>
                                       </p:cBhvr>
                                     </p:animEffect>
@@ -30841,7 +30742,7 @@
                                           </p:stCondLst>
                                         </p:cTn>
                                         <p:tgtEl>
-                                          <p:spTgt spid="21"/>
+                                          <p:spTgt spid="22"/>
                                         </p:tgtEl>
                                         <p:attrNameLst>
                                           <p:attrName>style.visibility</p:attrName>
@@ -30855,7 +30756,7 @@
                                       <p:cBhvr>
                                         <p:cTn id="58" dur="500"/>
                                         <p:tgtEl>
-                                          <p:spTgt spid="21"/>
+                                          <p:spTgt spid="22"/>
                                         </p:tgtEl>
                                       </p:cBhvr>
                                     </p:animEffect>
@@ -30876,7 +30777,7 @@
                                           </p:stCondLst>
                                         </p:cTn>
                                         <p:tgtEl>
-                                          <p:spTgt spid="22"/>
+                                          <p:spTgt spid="23"/>
                                         </p:tgtEl>
                                         <p:attrNameLst>
                                           <p:attrName>style.visibility</p:attrName>
@@ -30890,7 +30791,7 @@
                                       <p:cBhvr>
                                         <p:cTn id="61" dur="500"/>
                                         <p:tgtEl>
-                                          <p:spTgt spid="22"/>
+                                          <p:spTgt spid="23"/>
                                         </p:tgtEl>
                                       </p:cBhvr>
                                     </p:animEffect>
@@ -30911,7 +30812,7 @@
                                           </p:stCondLst>
                                         </p:cTn>
                                         <p:tgtEl>
-                                          <p:spTgt spid="23"/>
+                                          <p:spTgt spid="24"/>
                                         </p:tgtEl>
                                         <p:attrNameLst>
                                           <p:attrName>style.visibility</p:attrName>
@@ -30925,7 +30826,7 @@
                                       <p:cBhvr>
                                         <p:cTn id="64" dur="500"/>
                                         <p:tgtEl>
-                                          <p:spTgt spid="23"/>
+                                          <p:spTgt spid="24"/>
                                         </p:tgtEl>
                                       </p:cBhvr>
                                     </p:animEffect>
@@ -30946,7 +30847,7 @@
                                           </p:stCondLst>
                                         </p:cTn>
                                         <p:tgtEl>
-                                          <p:spTgt spid="24"/>
+                                          <p:spTgt spid="25"/>
                                         </p:tgtEl>
                                         <p:attrNameLst>
                                           <p:attrName>style.visibility</p:attrName>
@@ -30960,7 +30861,7 @@
                                       <p:cBhvr>
                                         <p:cTn id="67" dur="500"/>
                                         <p:tgtEl>
-                                          <p:spTgt spid="24"/>
+                                          <p:spTgt spid="25"/>
                                         </p:tgtEl>
                                       </p:cBhvr>
                                     </p:animEffect>
@@ -30981,7 +30882,7 @@
                                           </p:stCondLst>
                                         </p:cTn>
                                         <p:tgtEl>
-                                          <p:spTgt spid="25"/>
+                                          <p:spTgt spid="27"/>
                                         </p:tgtEl>
                                         <p:attrNameLst>
                                           <p:attrName>style.visibility</p:attrName>
@@ -30995,7 +30896,7 @@
                                       <p:cBhvr>
                                         <p:cTn id="70" dur="500"/>
                                         <p:tgtEl>
-                                          <p:spTgt spid="25"/>
+                                          <p:spTgt spid="27"/>
                                         </p:tgtEl>
                                       </p:cBhvr>
                                     </p:animEffect>
@@ -31016,7 +30917,7 @@
                                           </p:stCondLst>
                                         </p:cTn>
                                         <p:tgtEl>
-                                          <p:spTgt spid="26"/>
+                                          <p:spTgt spid="28"/>
                                         </p:tgtEl>
                                         <p:attrNameLst>
                                           <p:attrName>style.visibility</p:attrName>
@@ -31030,7 +30931,7 @@
                                       <p:cBhvr>
                                         <p:cTn id="73" dur="500"/>
                                         <p:tgtEl>
-                                          <p:spTgt spid="26"/>
+                                          <p:spTgt spid="28"/>
                                         </p:tgtEl>
                                       </p:cBhvr>
                                     </p:animEffect>
@@ -31051,7 +30952,7 @@
                                           </p:stCondLst>
                                         </p:cTn>
                                         <p:tgtEl>
-                                          <p:spTgt spid="27"/>
+                                          <p:spTgt spid="29"/>
                                         </p:tgtEl>
                                         <p:attrNameLst>
                                           <p:attrName>style.visibility</p:attrName>
@@ -31065,7 +30966,7 @@
                                       <p:cBhvr>
                                         <p:cTn id="76" dur="500"/>
                                         <p:tgtEl>
-                                          <p:spTgt spid="27"/>
+                                          <p:spTgt spid="29"/>
                                         </p:tgtEl>
                                       </p:cBhvr>
                                     </p:animEffect>
@@ -31086,7 +30987,7 @@
                                           </p:stCondLst>
                                         </p:cTn>
                                         <p:tgtEl>
-                                          <p:spTgt spid="28"/>
+                                          <p:spTgt spid="30"/>
                                         </p:tgtEl>
                                         <p:attrNameLst>
                                           <p:attrName>style.visibility</p:attrName>
@@ -31100,7 +31001,7 @@
                                       <p:cBhvr>
                                         <p:cTn id="79" dur="500"/>
                                         <p:tgtEl>
-                                          <p:spTgt spid="28"/>
+                                          <p:spTgt spid="30"/>
                                         </p:tgtEl>
                                       </p:cBhvr>
                                     </p:animEffect>
@@ -31121,7 +31022,7 @@
                                           </p:stCondLst>
                                         </p:cTn>
                                         <p:tgtEl>
-                                          <p:spTgt spid="29"/>
+                                          <p:spTgt spid="31"/>
                                         </p:tgtEl>
                                         <p:attrNameLst>
                                           <p:attrName>style.visibility</p:attrName>
@@ -31135,7 +31036,7 @@
                                       <p:cBhvr>
                                         <p:cTn id="82" dur="500"/>
                                         <p:tgtEl>
-                                          <p:spTgt spid="29"/>
+                                          <p:spTgt spid="31"/>
                                         </p:tgtEl>
                                       </p:cBhvr>
                                     </p:animEffect>
@@ -31156,7 +31057,7 @@
                                           </p:stCondLst>
                                         </p:cTn>
                                         <p:tgtEl>
-                                          <p:spTgt spid="30"/>
+                                          <p:spTgt spid="32"/>
                                         </p:tgtEl>
                                         <p:attrNameLst>
                                           <p:attrName>style.visibility</p:attrName>
@@ -31170,7 +31071,7 @@
                                       <p:cBhvr>
                                         <p:cTn id="85" dur="500"/>
                                         <p:tgtEl>
-                                          <p:spTgt spid="30"/>
+                                          <p:spTgt spid="32"/>
                                         </p:tgtEl>
                                       </p:cBhvr>
                                     </p:animEffect>
@@ -31191,7 +31092,7 @@
                                           </p:stCondLst>
                                         </p:cTn>
                                         <p:tgtEl>
-                                          <p:spTgt spid="31"/>
+                                          <p:spTgt spid="33"/>
                                         </p:tgtEl>
                                         <p:attrNameLst>
                                           <p:attrName>style.visibility</p:attrName>
@@ -31205,7 +31106,7 @@
                                       <p:cBhvr>
                                         <p:cTn id="88" dur="500"/>
                                         <p:tgtEl>
-                                          <p:spTgt spid="31"/>
+                                          <p:spTgt spid="33"/>
                                         </p:tgtEl>
                                       </p:cBhvr>
                                     </p:animEffect>
@@ -31226,7 +31127,7 @@
                                           </p:stCondLst>
                                         </p:cTn>
                                         <p:tgtEl>
-                                          <p:spTgt spid="32"/>
+                                          <p:spTgt spid="34"/>
                                         </p:tgtEl>
                                         <p:attrNameLst>
                                           <p:attrName>style.visibility</p:attrName>
@@ -31240,7 +31141,7 @@
                                       <p:cBhvr>
                                         <p:cTn id="91" dur="500"/>
                                         <p:tgtEl>
-                                          <p:spTgt spid="32"/>
+                                          <p:spTgt spid="34"/>
                                         </p:tgtEl>
                                       </p:cBhvr>
                                     </p:animEffect>
@@ -31261,7 +31162,7 @@
                                           </p:stCondLst>
                                         </p:cTn>
                                         <p:tgtEl>
-                                          <p:spTgt spid="33"/>
+                                          <p:spTgt spid="35"/>
                                         </p:tgtEl>
                                         <p:attrNameLst>
                                           <p:attrName>style.visibility</p:attrName>
@@ -31275,7 +31176,7 @@
                                       <p:cBhvr>
                                         <p:cTn id="94" dur="500"/>
                                         <p:tgtEl>
-                                          <p:spTgt spid="33"/>
+                                          <p:spTgt spid="35"/>
                                         </p:tgtEl>
                                       </p:cBhvr>
                                     </p:animEffect>
@@ -31296,7 +31197,7 @@
                                           </p:stCondLst>
                                         </p:cTn>
                                         <p:tgtEl>
-                                          <p:spTgt spid="34"/>
+                                          <p:spTgt spid="36"/>
                                         </p:tgtEl>
                                         <p:attrNameLst>
                                           <p:attrName>style.visibility</p:attrName>
@@ -31310,7 +31211,7 @@
                                       <p:cBhvr>
                                         <p:cTn id="97" dur="500"/>
                                         <p:tgtEl>
-                                          <p:spTgt spid="34"/>
+                                          <p:spTgt spid="36"/>
                                         </p:tgtEl>
                                       </p:cBhvr>
                                     </p:animEffect>
@@ -31331,7 +31232,7 @@
                                           </p:stCondLst>
                                         </p:cTn>
                                         <p:tgtEl>
-                                          <p:spTgt spid="35"/>
+                                          <p:spTgt spid="37"/>
                                         </p:tgtEl>
                                         <p:attrNameLst>
                                           <p:attrName>style.visibility</p:attrName>
@@ -31345,7 +31246,7 @@
                                       <p:cBhvr>
                                         <p:cTn id="100" dur="500"/>
                                         <p:tgtEl>
-                                          <p:spTgt spid="35"/>
+                                          <p:spTgt spid="37"/>
                                         </p:tgtEl>
                                       </p:cBhvr>
                                     </p:animEffect>
@@ -31366,7 +31267,7 @@
                                           </p:stCondLst>
                                         </p:cTn>
                                         <p:tgtEl>
-                                          <p:spTgt spid="36"/>
+                                          <p:spTgt spid="38"/>
                                         </p:tgtEl>
                                         <p:attrNameLst>
                                           <p:attrName>style.visibility</p:attrName>
@@ -31380,7 +31281,7 @@
                                       <p:cBhvr>
                                         <p:cTn id="103" dur="500"/>
                                         <p:tgtEl>
-                                          <p:spTgt spid="36"/>
+                                          <p:spTgt spid="38"/>
                                         </p:tgtEl>
                                       </p:cBhvr>
                                     </p:animEffect>
@@ -31401,7 +31302,7 @@
                                           </p:stCondLst>
                                         </p:cTn>
                                         <p:tgtEl>
-                                          <p:spTgt spid="37"/>
+                                          <p:spTgt spid="40"/>
                                         </p:tgtEl>
                                         <p:attrNameLst>
                                           <p:attrName>style.visibility</p:attrName>
@@ -31415,7 +31316,7 @@
                                       <p:cBhvr>
                                         <p:cTn id="106" dur="500"/>
                                         <p:tgtEl>
-                                          <p:spTgt spid="37"/>
+                                          <p:spTgt spid="40"/>
                                         </p:tgtEl>
                                       </p:cBhvr>
                                     </p:animEffect>
@@ -31436,7 +31337,7 @@
                                           </p:stCondLst>
                                         </p:cTn>
                                         <p:tgtEl>
-                                          <p:spTgt spid="38"/>
+                                          <p:spTgt spid="41"/>
                                         </p:tgtEl>
                                         <p:attrNameLst>
                                           <p:attrName>style.visibility</p:attrName>
@@ -31450,7 +31351,7 @@
                                       <p:cBhvr>
                                         <p:cTn id="109" dur="500"/>
                                         <p:tgtEl>
-                                          <p:spTgt spid="38"/>
+                                          <p:spTgt spid="41"/>
                                         </p:tgtEl>
                                       </p:cBhvr>
                                     </p:animEffect>
@@ -31458,7 +31359,7 @@
                                 </p:cTn>
                               </p:par>
                               <p:par>
-                                <p:cTn id="110" presetID="10" presetClass="entr" presetSubtype="0" fill="hold" grpId="0" nodeType="withEffect">
+                                <p:cTn id="110" presetID="10" presetClass="entr" presetSubtype="0" fill="hold" nodeType="withEffect">
                                   <p:stCondLst>
                                     <p:cond delay="0"/>
                                   </p:stCondLst>
@@ -31471,7 +31372,7 @@
                                           </p:stCondLst>
                                         </p:cTn>
                                         <p:tgtEl>
-                                          <p:spTgt spid="40"/>
+                                          <p:spTgt spid="42"/>
                                         </p:tgtEl>
                                         <p:attrNameLst>
                                           <p:attrName>style.visibility</p:attrName>
@@ -31485,7 +31386,7 @@
                                       <p:cBhvr>
                                         <p:cTn id="112" dur="500"/>
                                         <p:tgtEl>
-                                          <p:spTgt spid="40"/>
+                                          <p:spTgt spid="42"/>
                                         </p:tgtEl>
                                       </p:cBhvr>
                                     </p:animEffect>
@@ -31493,7 +31394,7 @@
                                 </p:cTn>
                               </p:par>
                               <p:par>
-                                <p:cTn id="113" presetID="10" presetClass="entr" presetSubtype="0" fill="hold" grpId="0" nodeType="withEffect">
+                                <p:cTn id="113" presetID="10" presetClass="entr" presetSubtype="0" fill="hold" nodeType="withEffect">
                                   <p:stCondLst>
                                     <p:cond delay="0"/>
                                   </p:stCondLst>
@@ -31506,7 +31407,7 @@
                                           </p:stCondLst>
                                         </p:cTn>
                                         <p:tgtEl>
-                                          <p:spTgt spid="41"/>
+                                          <p:spTgt spid="43"/>
                                         </p:tgtEl>
                                         <p:attrNameLst>
                                           <p:attrName>style.visibility</p:attrName>
@@ -31520,7 +31421,7 @@
                                       <p:cBhvr>
                                         <p:cTn id="115" dur="500"/>
                                         <p:tgtEl>
-                                          <p:spTgt spid="41"/>
+                                          <p:spTgt spid="43"/>
                                         </p:tgtEl>
                                       </p:cBhvr>
                                     </p:animEffect>
@@ -31541,7 +31442,7 @@
                                           </p:stCondLst>
                                         </p:cTn>
                                         <p:tgtEl>
-                                          <p:spTgt spid="42"/>
+                                          <p:spTgt spid="44"/>
                                         </p:tgtEl>
                                         <p:attrNameLst>
                                           <p:attrName>style.visibility</p:attrName>
@@ -31555,7 +31456,7 @@
                                       <p:cBhvr>
                                         <p:cTn id="118" dur="500"/>
                                         <p:tgtEl>
-                                          <p:spTgt spid="42"/>
+                                          <p:spTgt spid="44"/>
                                         </p:tgtEl>
                                       </p:cBhvr>
                                     </p:animEffect>
@@ -31576,7 +31477,7 @@
                                           </p:stCondLst>
                                         </p:cTn>
                                         <p:tgtEl>
-                                          <p:spTgt spid="43"/>
+                                          <p:spTgt spid="45"/>
                                         </p:tgtEl>
                                         <p:attrNameLst>
                                           <p:attrName>style.visibility</p:attrName>
@@ -31590,7 +31491,7 @@
                                       <p:cBhvr>
                                         <p:cTn id="121" dur="500"/>
                                         <p:tgtEl>
-                                          <p:spTgt spid="43"/>
+                                          <p:spTgt spid="45"/>
                                         </p:tgtEl>
                                       </p:cBhvr>
                                     </p:animEffect>
@@ -31611,7 +31512,7 @@
                                           </p:stCondLst>
                                         </p:cTn>
                                         <p:tgtEl>
-                                          <p:spTgt spid="44"/>
+                                          <p:spTgt spid="46"/>
                                         </p:tgtEl>
                                         <p:attrNameLst>
                                           <p:attrName>style.visibility</p:attrName>
@@ -31625,7 +31526,7 @@
                                       <p:cBhvr>
                                         <p:cTn id="124" dur="500"/>
                                         <p:tgtEl>
-                                          <p:spTgt spid="44"/>
+                                          <p:spTgt spid="46"/>
                                         </p:tgtEl>
                                       </p:cBhvr>
                                     </p:animEffect>
@@ -31646,7 +31547,7 @@
                                           </p:stCondLst>
                                         </p:cTn>
                                         <p:tgtEl>
-                                          <p:spTgt spid="45"/>
+                                          <p:spTgt spid="47"/>
                                         </p:tgtEl>
                                         <p:attrNameLst>
                                           <p:attrName>style.visibility</p:attrName>
@@ -31660,7 +31561,7 @@
                                       <p:cBhvr>
                                         <p:cTn id="127" dur="500"/>
                                         <p:tgtEl>
-                                          <p:spTgt spid="45"/>
+                                          <p:spTgt spid="47"/>
                                         </p:tgtEl>
                                       </p:cBhvr>
                                     </p:animEffect>
@@ -31681,7 +31582,7 @@
                                           </p:stCondLst>
                                         </p:cTn>
                                         <p:tgtEl>
-                                          <p:spTgt spid="46"/>
+                                          <p:spTgt spid="48"/>
                                         </p:tgtEl>
                                         <p:attrNameLst>
                                           <p:attrName>style.visibility</p:attrName>
@@ -31695,7 +31596,7 @@
                                       <p:cBhvr>
                                         <p:cTn id="130" dur="500"/>
                                         <p:tgtEl>
-                                          <p:spTgt spid="46"/>
+                                          <p:spTgt spid="48"/>
                                         </p:tgtEl>
                                       </p:cBhvr>
                                     </p:animEffect>
@@ -31716,7 +31617,7 @@
                                           </p:stCondLst>
                                         </p:cTn>
                                         <p:tgtEl>
-                                          <p:spTgt spid="47"/>
+                                          <p:spTgt spid="49"/>
                                         </p:tgtEl>
                                         <p:attrNameLst>
                                           <p:attrName>style.visibility</p:attrName>
@@ -31730,7 +31631,7 @@
                                       <p:cBhvr>
                                         <p:cTn id="133" dur="500"/>
                                         <p:tgtEl>
-                                          <p:spTgt spid="47"/>
+                                          <p:spTgt spid="49"/>
                                         </p:tgtEl>
                                       </p:cBhvr>
                                     </p:animEffect>
@@ -31751,7 +31652,7 @@
                                           </p:stCondLst>
                                         </p:cTn>
                                         <p:tgtEl>
-                                          <p:spTgt spid="48"/>
+                                          <p:spTgt spid="50"/>
                                         </p:tgtEl>
                                         <p:attrNameLst>
                                           <p:attrName>style.visibility</p:attrName>
@@ -31765,7 +31666,7 @@
                                       <p:cBhvr>
                                         <p:cTn id="136" dur="500"/>
                                         <p:tgtEl>
-                                          <p:spTgt spid="48"/>
+                                          <p:spTgt spid="50"/>
                                         </p:tgtEl>
                                       </p:cBhvr>
                                     </p:animEffect>
@@ -31786,7 +31687,7 @@
                                           </p:stCondLst>
                                         </p:cTn>
                                         <p:tgtEl>
-                                          <p:spTgt spid="49"/>
+                                          <p:spTgt spid="51"/>
                                         </p:tgtEl>
                                         <p:attrNameLst>
                                           <p:attrName>style.visibility</p:attrName>
@@ -31800,7 +31701,7 @@
                                       <p:cBhvr>
                                         <p:cTn id="139" dur="500"/>
                                         <p:tgtEl>
-                                          <p:spTgt spid="49"/>
+                                          <p:spTgt spid="51"/>
                                         </p:tgtEl>
                                       </p:cBhvr>
                                     </p:animEffect>
@@ -31821,7 +31722,7 @@
                                           </p:stCondLst>
                                         </p:cTn>
                                         <p:tgtEl>
-                                          <p:spTgt spid="50"/>
+                                          <p:spTgt spid="52"/>
                                         </p:tgtEl>
                                         <p:attrNameLst>
                                           <p:attrName>style.visibility</p:attrName>
@@ -31835,7 +31736,7 @@
                                       <p:cBhvr>
                                         <p:cTn id="142" dur="500"/>
                                         <p:tgtEl>
-                                          <p:spTgt spid="50"/>
+                                          <p:spTgt spid="52"/>
                                         </p:tgtEl>
                                       </p:cBhvr>
                                     </p:animEffect>
@@ -31856,7 +31757,7 @@
                                           </p:stCondLst>
                                         </p:cTn>
                                         <p:tgtEl>
-                                          <p:spTgt spid="51"/>
+                                          <p:spTgt spid="57"/>
                                         </p:tgtEl>
                                         <p:attrNameLst>
                                           <p:attrName>style.visibility</p:attrName>
@@ -31870,76 +31771,6 @@
                                       <p:cBhvr>
                                         <p:cTn id="145" dur="500"/>
                                         <p:tgtEl>
-                                          <p:spTgt spid="51"/>
-                                        </p:tgtEl>
-                                      </p:cBhvr>
-                                    </p:animEffect>
-                                  </p:childTnLst>
-                                </p:cTn>
-                              </p:par>
-                              <p:par>
-                                <p:cTn id="146" presetID="10" presetClass="entr" presetSubtype="0" fill="hold" nodeType="withEffect">
-                                  <p:stCondLst>
-                                    <p:cond delay="0"/>
-                                  </p:stCondLst>
-                                  <p:childTnLst>
-                                    <p:set>
-                                      <p:cBhvr>
-                                        <p:cTn id="147" dur="1" fill="hold">
-                                          <p:stCondLst>
-                                            <p:cond delay="0"/>
-                                          </p:stCondLst>
-                                        </p:cTn>
-                                        <p:tgtEl>
-                                          <p:spTgt spid="52"/>
-                                        </p:tgtEl>
-                                        <p:attrNameLst>
-                                          <p:attrName>style.visibility</p:attrName>
-                                        </p:attrNameLst>
-                                      </p:cBhvr>
-                                      <p:to>
-                                        <p:strVal val="visible"/>
-                                      </p:to>
-                                    </p:set>
-                                    <p:animEffect transition="in" filter="fade">
-                                      <p:cBhvr>
-                                        <p:cTn id="148" dur="500"/>
-                                        <p:tgtEl>
-                                          <p:spTgt spid="52"/>
-                                        </p:tgtEl>
-                                      </p:cBhvr>
-                                    </p:animEffect>
-                                  </p:childTnLst>
-                                </p:cTn>
-                              </p:par>
-                              <p:par>
-                                <p:cTn id="149" presetID="10" presetClass="entr" presetSubtype="0" fill="hold" nodeType="withEffect">
-                                  <p:stCondLst>
-                                    <p:cond delay="0"/>
-                                  </p:stCondLst>
-                                  <p:childTnLst>
-                                    <p:set>
-                                      <p:cBhvr>
-                                        <p:cTn id="150" dur="1" fill="hold">
-                                          <p:stCondLst>
-                                            <p:cond delay="0"/>
-                                          </p:stCondLst>
-                                        </p:cTn>
-                                        <p:tgtEl>
-                                          <p:spTgt spid="57"/>
-                                        </p:tgtEl>
-                                        <p:attrNameLst>
-                                          <p:attrName>style.visibility</p:attrName>
-                                        </p:attrNameLst>
-                                      </p:cBhvr>
-                                      <p:to>
-                                        <p:strVal val="visible"/>
-                                      </p:to>
-                                    </p:set>
-                                    <p:animEffect transition="in" filter="fade">
-                                      <p:cBhvr>
-                                        <p:cTn id="151" dur="500"/>
-                                        <p:tgtEl>
                                           <p:spTgt spid="57"/>
                                         </p:tgtEl>
                                       </p:cBhvr>
@@ -31948,14 +31779,14 @@
                                 </p:cTn>
                               </p:par>
                               <p:par>
-                                <p:cTn id="152" presetID="10" presetClass="entr" presetSubtype="0" fill="hold" grpId="0" nodeType="withEffect">
+                                <p:cTn id="146" presetID="10" presetClass="entr" presetSubtype="0" fill="hold" grpId="0" nodeType="withEffect">
                                   <p:stCondLst>
                                     <p:cond delay="0"/>
                                   </p:stCondLst>
                                   <p:childTnLst>
                                     <p:set>
                                       <p:cBhvr>
-                                        <p:cTn id="153" dur="1" fill="hold">
+                                        <p:cTn id="147" dur="1" fill="hold">
                                           <p:stCondLst>
                                             <p:cond delay="0"/>
                                           </p:stCondLst>
@@ -31973,7 +31804,7 @@
                                     </p:set>
                                     <p:animEffect transition="in" filter="fade">
                                       <p:cBhvr>
-                                        <p:cTn id="154" dur="500"/>
+                                        <p:cTn id="148" dur="500"/>
                                         <p:tgtEl>
                                           <p:spTgt spid="59"/>
                                         </p:tgtEl>
@@ -31983,14 +31814,14 @@
                                 </p:cTn>
                               </p:par>
                               <p:par>
-                                <p:cTn id="155" presetID="10" presetClass="entr" presetSubtype="0" fill="hold" grpId="0" nodeType="withEffect">
+                                <p:cTn id="149" presetID="10" presetClass="entr" presetSubtype="0" fill="hold" grpId="0" nodeType="withEffect">
                                   <p:stCondLst>
                                     <p:cond delay="0"/>
                                   </p:stCondLst>
                                   <p:childTnLst>
                                     <p:set>
                                       <p:cBhvr>
-                                        <p:cTn id="156" dur="1" fill="hold">
+                                        <p:cTn id="150" dur="1" fill="hold">
                                           <p:stCondLst>
                                             <p:cond delay="0"/>
                                           </p:stCondLst>
@@ -32008,9 +31839,79 @@
                                     </p:set>
                                     <p:animEffect transition="in" filter="fade">
                                       <p:cBhvr>
+                                        <p:cTn id="151" dur="500"/>
+                                        <p:tgtEl>
+                                          <p:spTgt spid="60"/>
+                                        </p:tgtEl>
+                                      </p:cBhvr>
+                                    </p:animEffect>
+                                  </p:childTnLst>
+                                </p:cTn>
+                              </p:par>
+                              <p:par>
+                                <p:cTn id="152" presetID="10" presetClass="entr" presetSubtype="0" fill="hold" nodeType="withEffect">
+                                  <p:stCondLst>
+                                    <p:cond delay="0"/>
+                                  </p:stCondLst>
+                                  <p:childTnLst>
+                                    <p:set>
+                                      <p:cBhvr>
+                                        <p:cTn id="153" dur="1" fill="hold">
+                                          <p:stCondLst>
+                                            <p:cond delay="0"/>
+                                          </p:stCondLst>
+                                        </p:cTn>
+                                        <p:tgtEl>
+                                          <p:spTgt spid="61"/>
+                                        </p:tgtEl>
+                                        <p:attrNameLst>
+                                          <p:attrName>style.visibility</p:attrName>
+                                        </p:attrNameLst>
+                                      </p:cBhvr>
+                                      <p:to>
+                                        <p:strVal val="visible"/>
+                                      </p:to>
+                                    </p:set>
+                                    <p:animEffect transition="in" filter="fade">
+                                      <p:cBhvr>
+                                        <p:cTn id="154" dur="500"/>
+                                        <p:tgtEl>
+                                          <p:spTgt spid="61"/>
+                                        </p:tgtEl>
+                                      </p:cBhvr>
+                                    </p:animEffect>
+                                  </p:childTnLst>
+                                </p:cTn>
+                              </p:par>
+                              <p:par>
+                                <p:cTn id="155" presetID="10" presetClass="entr" presetSubtype="0" fill="hold" nodeType="withEffect">
+                                  <p:stCondLst>
+                                    <p:cond delay="0"/>
+                                  </p:stCondLst>
+                                  <p:childTnLst>
+                                    <p:set>
+                                      <p:cBhvr>
+                                        <p:cTn id="156" dur="1" fill="hold">
+                                          <p:stCondLst>
+                                            <p:cond delay="0"/>
+                                          </p:stCondLst>
+                                        </p:cTn>
+                                        <p:tgtEl>
+                                          <p:spTgt spid="62"/>
+                                        </p:tgtEl>
+                                        <p:attrNameLst>
+                                          <p:attrName>style.visibility</p:attrName>
+                                        </p:attrNameLst>
+                                      </p:cBhvr>
+                                      <p:to>
+                                        <p:strVal val="visible"/>
+                                      </p:to>
+                                    </p:set>
+                                    <p:animEffect transition="in" filter="fade">
+                                      <p:cBhvr>
                                         <p:cTn id="157" dur="500"/>
                                         <p:tgtEl>
-                                          <p:spTgt spid="60"/>
+                                          <p:spTgt spid="62"/>
                                         </p:tgtEl>
                                       </p:cBhvr>
                                     </p:animEffect>
@@ -32031,7 +31932,7 @@
                                           </p:stCondLst>
                                         </p:cTn>
                                         <p:tgtEl>
-                                          <p:spTgt spid="61"/>
+                                          <p:spTgt spid="63"/>
                                         </p:tgtEl>
                                         <p:attrNameLst>
                                           <p:attrName>style.visibility</p:attrName>
@@ -32045,76 +31946,6 @@
                                       <p:cBhvr>
                                         <p:cTn id="160" dur="500"/>
                                         <p:tgtEl>
-                                          <p:spTgt spid="61"/>
-                                        </p:tgtEl>
-                                      </p:cBhvr>
-                                    </p:animEffect>
-                                  </p:childTnLst>
-                                </p:cTn>
-                              </p:par>
-                              <p:par>
-                                <p:cTn id="161" presetID="10" presetClass="entr" presetSubtype="0" fill="hold" nodeType="withEffect">
-                                  <p:stCondLst>
-                                    <p:cond delay="0"/>
-                                  </p:stCondLst>
-                                  <p:childTnLst>
-                                    <p:set>
-                                      <p:cBhvr>
-                                        <p:cTn id="162" dur="1" fill="hold">
-                                          <p:stCondLst>
-                                            <p:cond delay="0"/>
-                                          </p:stCondLst>
-                                        </p:cTn>
-                                        <p:tgtEl>
-                                          <p:spTgt spid="62"/>
-                                        </p:tgtEl>
-                                        <p:attrNameLst>
-                                          <p:attrName>style.visibility</p:attrName>
-                                        </p:attrNameLst>
-                                      </p:cBhvr>
-                                      <p:to>
-                                        <p:strVal val="visible"/>
-                                      </p:to>
-                                    </p:set>
-                                    <p:animEffect transition="in" filter="fade">
-                                      <p:cBhvr>
-                                        <p:cTn id="163" dur="500"/>
-                                        <p:tgtEl>
-                                          <p:spTgt spid="62"/>
-                                        </p:tgtEl>
-                                      </p:cBhvr>
-                                    </p:animEffect>
-                                  </p:childTnLst>
-                                </p:cTn>
-                              </p:par>
-                              <p:par>
-                                <p:cTn id="164" presetID="10" presetClass="entr" presetSubtype="0" fill="hold" nodeType="withEffect">
-                                  <p:stCondLst>
-                                    <p:cond delay="0"/>
-                                  </p:stCondLst>
-                                  <p:childTnLst>
-                                    <p:set>
-                                      <p:cBhvr>
-                                        <p:cTn id="165" dur="1" fill="hold">
-                                          <p:stCondLst>
-                                            <p:cond delay="0"/>
-                                          </p:stCondLst>
-                                        </p:cTn>
-                                        <p:tgtEl>
-                                          <p:spTgt spid="63"/>
-                                        </p:tgtEl>
-                                        <p:attrNameLst>
-                                          <p:attrName>style.visibility</p:attrName>
-                                        </p:attrNameLst>
-                                      </p:cBhvr>
-                                      <p:to>
-                                        <p:strVal val="visible"/>
-                                      </p:to>
-                                    </p:set>
-                                    <p:animEffect transition="in" filter="fade">
-                                      <p:cBhvr>
-                                        <p:cTn id="166" dur="500"/>
-                                        <p:tgtEl>
                                           <p:spTgt spid="63"/>
                                         </p:tgtEl>
                                       </p:cBhvr>
@@ -32123,14 +31954,14 @@
                                 </p:cTn>
                               </p:par>
                               <p:par>
-                                <p:cTn id="167" presetID="10" presetClass="entr" presetSubtype="0" fill="hold" grpId="0" nodeType="withEffect">
+                                <p:cTn id="161" presetID="10" presetClass="entr" presetSubtype="0" fill="hold" grpId="0" nodeType="withEffect">
                                   <p:stCondLst>
                                     <p:cond delay="0"/>
                                   </p:stCondLst>
                                   <p:childTnLst>
                                     <p:set>
                                       <p:cBhvr>
-                                        <p:cTn id="168" dur="1" fill="hold">
+                                        <p:cTn id="162" dur="1" fill="hold">
                                           <p:stCondLst>
                                             <p:cond delay="0"/>
                                           </p:stCondLst>
@@ -32148,9 +31979,79 @@
                                     </p:set>
                                     <p:animEffect transition="in" filter="fade">
                                       <p:cBhvr>
+                                        <p:cTn id="163" dur="500"/>
+                                        <p:tgtEl>
+                                          <p:spTgt spid="64"/>
+                                        </p:tgtEl>
+                                      </p:cBhvr>
+                                    </p:animEffect>
+                                  </p:childTnLst>
+                                </p:cTn>
+                              </p:par>
+                              <p:par>
+                                <p:cTn id="164" presetID="10" presetClass="entr" presetSubtype="0" fill="hold" grpId="0" nodeType="withEffect">
+                                  <p:stCondLst>
+                                    <p:cond delay="0"/>
+                                  </p:stCondLst>
+                                  <p:childTnLst>
+                                    <p:set>
+                                      <p:cBhvr>
+                                        <p:cTn id="165" dur="1" fill="hold">
+                                          <p:stCondLst>
+                                            <p:cond delay="0"/>
+                                          </p:stCondLst>
+                                        </p:cTn>
+                                        <p:tgtEl>
+                                          <p:spTgt spid="65"/>
+                                        </p:tgtEl>
+                                        <p:attrNameLst>
+                                          <p:attrName>style.visibility</p:attrName>
+                                        </p:attrNameLst>
+                                      </p:cBhvr>
+                                      <p:to>
+                                        <p:strVal val="visible"/>
+                                      </p:to>
+                                    </p:set>
+                                    <p:animEffect transition="in" filter="fade">
+                                      <p:cBhvr>
+                                        <p:cTn id="166" dur="500"/>
+                                        <p:tgtEl>
+                                          <p:spTgt spid="65"/>
+                                        </p:tgtEl>
+                                      </p:cBhvr>
+                                    </p:animEffect>
+                                  </p:childTnLst>
+                                </p:cTn>
+                              </p:par>
+                              <p:par>
+                                <p:cTn id="167" presetID="10" presetClass="entr" presetSubtype="0" fill="hold" nodeType="withEffect">
+                                  <p:stCondLst>
+                                    <p:cond delay="0"/>
+                                  </p:stCondLst>
+                                  <p:childTnLst>
+                                    <p:set>
+                                      <p:cBhvr>
+                                        <p:cTn id="168" dur="1" fill="hold">
+                                          <p:stCondLst>
+                                            <p:cond delay="0"/>
+                                          </p:stCondLst>
+                                        </p:cTn>
+                                        <p:tgtEl>
+                                          <p:spTgt spid="66"/>
+                                        </p:tgtEl>
+                                        <p:attrNameLst>
+                                          <p:attrName>style.visibility</p:attrName>
+                                        </p:attrNameLst>
+                                      </p:cBhvr>
+                                      <p:to>
+                                        <p:strVal val="visible"/>
+                                      </p:to>
+                                    </p:set>
+                                    <p:animEffect transition="in" filter="fade">
+                                      <p:cBhvr>
                                         <p:cTn id="169" dur="500"/>
                                         <p:tgtEl>
-                                          <p:spTgt spid="64"/>
+                                          <p:spTgt spid="66"/>
                                         </p:tgtEl>
                                       </p:cBhvr>
                                     </p:animEffect>
@@ -32171,7 +32072,7 @@
                                           </p:stCondLst>
                                         </p:cTn>
                                         <p:tgtEl>
-                                          <p:spTgt spid="65"/>
+                                          <p:spTgt spid="69"/>
                                         </p:tgtEl>
                                         <p:attrNameLst>
                                           <p:attrName>style.visibility</p:attrName>
@@ -32185,76 +32086,6 @@
                                       <p:cBhvr>
                                         <p:cTn id="172" dur="500"/>
                                         <p:tgtEl>
-                                          <p:spTgt spid="65"/>
-                                        </p:tgtEl>
-                                      </p:cBhvr>
-                                    </p:animEffect>
-                                  </p:childTnLst>
-                                </p:cTn>
-                              </p:par>
-                              <p:par>
-                                <p:cTn id="173" presetID="10" presetClass="entr" presetSubtype="0" fill="hold" nodeType="withEffect">
-                                  <p:stCondLst>
-                                    <p:cond delay="0"/>
-                                  </p:stCondLst>
-                                  <p:childTnLst>
-                                    <p:set>
-                                      <p:cBhvr>
-                                        <p:cTn id="174" dur="1" fill="hold">
-                                          <p:stCondLst>
-                                            <p:cond delay="0"/>
-                                          </p:stCondLst>
-                                        </p:cTn>
-                                        <p:tgtEl>
-                                          <p:spTgt spid="66"/>
-                                        </p:tgtEl>
-                                        <p:attrNameLst>
-                                          <p:attrName>style.visibility</p:attrName>
-                                        </p:attrNameLst>
-                                      </p:cBhvr>
-                                      <p:to>
-                                        <p:strVal val="visible"/>
-                                      </p:to>
-                                    </p:set>
-                                    <p:animEffect transition="in" filter="fade">
-                                      <p:cBhvr>
-                                        <p:cTn id="175" dur="500"/>
-                                        <p:tgtEl>
-                                          <p:spTgt spid="66"/>
-                                        </p:tgtEl>
-                                      </p:cBhvr>
-                                    </p:animEffect>
-                                  </p:childTnLst>
-                                </p:cTn>
-                              </p:par>
-                              <p:par>
-                                <p:cTn id="176" presetID="10" presetClass="entr" presetSubtype="0" fill="hold" grpId="0" nodeType="withEffect">
-                                  <p:stCondLst>
-                                    <p:cond delay="0"/>
-                                  </p:stCondLst>
-                                  <p:childTnLst>
-                                    <p:set>
-                                      <p:cBhvr>
-                                        <p:cTn id="177" dur="1" fill="hold">
-                                          <p:stCondLst>
-                                            <p:cond delay="0"/>
-                                          </p:stCondLst>
-                                        </p:cTn>
-                                        <p:tgtEl>
-                                          <p:spTgt spid="69"/>
-                                        </p:tgtEl>
-                                        <p:attrNameLst>
-                                          <p:attrName>style.visibility</p:attrName>
-                                        </p:attrNameLst>
-                                      </p:cBhvr>
-                                      <p:to>
-                                        <p:strVal val="visible"/>
-                                      </p:to>
-                                    </p:set>
-                                    <p:animEffect transition="in" filter="fade">
-                                      <p:cBhvr>
-                                        <p:cTn id="178" dur="500"/>
-                                        <p:tgtEl>
                                           <p:spTgt spid="69"/>
                                         </p:tgtEl>
                                       </p:cBhvr>
@@ -32263,14 +32094,14 @@
                                 </p:cTn>
                               </p:par>
                               <p:par>
-                                <p:cTn id="179" presetID="10" presetClass="entr" presetSubtype="0" fill="hold" grpId="0" nodeType="withEffect">
+                                <p:cTn id="173" presetID="10" presetClass="entr" presetSubtype="0" fill="hold" grpId="0" nodeType="withEffect">
                                   <p:stCondLst>
                                     <p:cond delay="0"/>
                                   </p:stCondLst>
                                   <p:childTnLst>
                                     <p:set>
                                       <p:cBhvr>
-                                        <p:cTn id="180" dur="1" fill="hold">
+                                        <p:cTn id="174" dur="1" fill="hold">
                                           <p:stCondLst>
                                             <p:cond delay="0"/>
                                           </p:stCondLst>
@@ -32288,7 +32119,7 @@
                                     </p:set>
                                     <p:animEffect transition="in" filter="fade">
                                       <p:cBhvr>
-                                        <p:cTn id="181" dur="500"/>
+                                        <p:cTn id="175" dur="500"/>
                                         <p:tgtEl>
                                           <p:spTgt spid="39"/>
                                         </p:tgtEl>
@@ -32298,14 +32129,14 @@
                                 </p:cTn>
                               </p:par>
                               <p:par>
-                                <p:cTn id="182" presetID="10" presetClass="entr" presetSubtype="0" fill="hold" nodeType="withEffect">
+                                <p:cTn id="176" presetID="10" presetClass="entr" presetSubtype="0" fill="hold" nodeType="withEffect">
                                   <p:stCondLst>
                                     <p:cond delay="0"/>
                                   </p:stCondLst>
                                   <p:childTnLst>
                                     <p:set>
                                       <p:cBhvr>
-                                        <p:cTn id="183" dur="1" fill="hold">
+                                        <p:cTn id="177" dur="1" fill="hold">
                                           <p:stCondLst>
                                             <p:cond delay="0"/>
                                           </p:stCondLst>
@@ -32323,7 +32154,7 @@
                                     </p:set>
                                     <p:animEffect transition="in" filter="fade">
                                       <p:cBhvr>
-                                        <p:cTn id="184" dur="500"/>
+                                        <p:cTn id="178" dur="500"/>
                                         <p:tgtEl>
                                           <p:spTgt spid="67"/>
                                         </p:tgtEl>
@@ -32370,7 +32201,6 @@
       <p:bldP spid="11" grpId="0" animBg="1"/>
       <p:bldP spid="12" grpId="0" animBg="1"/>
       <p:bldP spid="13" grpId="0" animBg="1"/>
-      <p:bldP spid="14" grpId="0" animBg="1"/>
       <p:bldP spid="15" grpId="0" animBg="1"/>
       <p:bldP spid="16" grpId="0" animBg="1"/>
       <p:bldP spid="17" grpId="0" animBg="1"/>
@@ -32382,7 +32212,6 @@
       <p:bldP spid="23" grpId="0" animBg="1"/>
       <p:bldP spid="24" grpId="0" animBg="1"/>
       <p:bldP spid="25" grpId="0" animBg="1"/>
-      <p:bldP spid="26" grpId="0" animBg="1"/>
       <p:bldP spid="27" grpId="0" animBg="1"/>
       <p:bldP spid="28" grpId="0" animBg="1"/>
       <p:bldP spid="29" grpId="0" animBg="1"/>
@@ -33666,7 +33495,8 @@
               <a:rPr lang="nl-NL" sz="1100" dirty="0" smtClean="0">
                 <a:solidFill>
                   <a:schemeClr val="accent2">
-                    <a:lumMod val="75000"/>
+                    <a:lumMod val="60000"/>
+                    <a:lumOff val="40000"/>
                   </a:schemeClr>
                 </a:solidFill>
               </a:rPr>
@@ -33675,7 +33505,8 @@
             <a:endParaRPr lang="en-US" sz="1100" dirty="0">
               <a:solidFill>
                 <a:schemeClr val="accent2">
-                  <a:lumMod val="75000"/>
+                  <a:lumMod val="60000"/>
+                  <a:lumOff val="40000"/>
                 </a:schemeClr>
               </a:solidFill>
             </a:endParaRPr>
@@ -33720,7 +33551,8 @@
               <a:rPr lang="nl-NL" sz="1100" dirty="0" err="1" smtClean="0">
                 <a:solidFill>
                   <a:schemeClr val="accent2">
-                    <a:lumMod val="75000"/>
+                    <a:lumMod val="60000"/>
+                    <a:lumOff val="40000"/>
                   </a:schemeClr>
                 </a:solidFill>
               </a:rPr>
@@ -33729,61 +33561,8 @@
             <a:endParaRPr lang="en-US" sz="1100" dirty="0">
               <a:solidFill>
                 <a:schemeClr val="accent2">
-                  <a:lumMod val="75000"/>
-                </a:schemeClr>
-              </a:solidFill>
-            </a:endParaRPr>
-          </a:p>
-        </p:txBody>
-      </p:sp>
-      <p:sp>
-        <p:nvSpPr>
-          <p:cNvPr id="9" name="Cube 8"/>
-          <p:cNvSpPr/>
-          <p:nvPr/>
-        </p:nvSpPr>
-        <p:spPr>
-          <a:xfrm>
-            <a:off x="4058796" y="4941167"/>
-            <a:ext cx="999158" cy="545196"/>
-          </a:xfrm>
-          <a:prstGeom prst="cube">
-            <a:avLst/>
-          </a:prstGeom>
-        </p:spPr>
-        <p:style>
-          <a:lnRef idx="1">
-            <a:schemeClr val="accent2"/>
-          </a:lnRef>
-          <a:fillRef idx="2">
-            <a:schemeClr val="accent2"/>
-          </a:fillRef>
-          <a:effectRef idx="1">
-            <a:schemeClr val="accent2"/>
-          </a:effectRef>
-          <a:fontRef idx="minor">
-            <a:schemeClr val="dk1"/>
-          </a:fontRef>
-        </p:style>
-        <p:txBody>
-          <a:bodyPr rtlCol="0" anchor="ctr"/>
-          <a:lstStyle/>
-          <a:p>
-            <a:pPr algn="ctr"/>
-            <a:r>
-              <a:rPr lang="nl-NL" sz="1100" dirty="0">
-                <a:solidFill>
-                  <a:schemeClr val="accent2">
-                    <a:lumMod val="75000"/>
-                  </a:schemeClr>
-                </a:solidFill>
-              </a:rPr>
-              <a:t>JCS</a:t>
-            </a:r>
-            <a:endParaRPr lang="en-US" sz="1100" dirty="0">
-              <a:solidFill>
-                <a:schemeClr val="accent2">
-                  <a:lumMod val="75000"/>
+                  <a:lumMod val="60000"/>
+                  <a:lumOff val="40000"/>
                 </a:schemeClr>
               </a:solidFill>
             </a:endParaRPr>
@@ -33840,7 +33619,7 @@
         </p:nvCxnSpPr>
         <p:spPr>
           <a:xfrm flipV="1">
-            <a:off x="4762943" y="4248519"/>
+            <a:off x="4762943" y="4683963"/>
             <a:ext cx="2141571" cy="199015"/>
           </a:xfrm>
           <a:prstGeom prst="straightConnector1">
@@ -33878,7 +33657,7 @@
         </p:nvSpPr>
         <p:spPr>
           <a:xfrm>
-            <a:off x="4058796" y="4467979"/>
+            <a:off x="4058796" y="4903423"/>
             <a:ext cx="999158" cy="545196"/>
           </a:xfrm>
           <a:prstGeom prst="cube">
@@ -33920,7 +33699,7 @@
         </p:nvSpPr>
         <p:spPr>
           <a:xfrm>
-            <a:off x="4548837" y="4386199"/>
+            <a:off x="4548837" y="4821643"/>
             <a:ext cx="214106" cy="163559"/>
           </a:xfrm>
           <a:prstGeom prst="cube">
@@ -33985,7 +33764,7 @@
         </p:blipFill>
         <p:spPr bwMode="auto">
           <a:xfrm>
-            <a:off x="3772329" y="4073676"/>
+            <a:off x="3772329" y="4509120"/>
             <a:ext cx="700116" cy="692134"/>
           </a:xfrm>
           <a:prstGeom prst="rect">
@@ -34003,10 +33782,48 @@
           </a:extLst>
         </p:spPr>
       </p:pic>
+      <p:sp>
+        <p:nvSpPr>
+          <p:cNvPr id="15" name="TextBox 14"/>
+          <p:cNvSpPr txBox="1"/>
+          <p:nvPr/>
+        </p:nvSpPr>
+        <p:spPr>
+          <a:xfrm>
+            <a:off x="5364089" y="44624"/>
+            <a:ext cx="3888432" cy="369332"/>
+          </a:xfrm>
+          <a:prstGeom prst="rect">
+            <a:avLst/>
+          </a:prstGeom>
+          <a:noFill/>
+        </p:spPr>
+        <p:txBody>
+          <a:bodyPr wrap="square" rtlCol="0">
+            <a:spAutoFit/>
+          </a:bodyPr>
+          <a:lstStyle/>
+          <a:p>
+            <a:r>
+              <a:rPr lang="en-US" dirty="0" smtClean="0"/>
+              <a:t>JET Web App : </a:t>
+            </a:r>
+            <a:r>
+              <a:rPr lang="en-US" b="1" u="sng" dirty="0" smtClean="0"/>
+              <a:t>http</a:t>
+            </a:r>
+            <a:r>
+              <a:rPr lang="en-US" b="1" u="sng" dirty="0"/>
+              <a:t>://bit.ly/acesdemo</a:t>
+            </a:r>
+            <a:endParaRPr lang="en-US" b="1" dirty="0"/>
+          </a:p>
+        </p:txBody>
+      </p:sp>
     </p:spTree>
     <p:extLst>
       <p:ext uri="{BB962C8B-B14F-4D97-AF65-F5344CB8AC3E}">
-        <p14:creationId xmlns:p14="http://schemas.microsoft.com/office/powerpoint/2010/main" val="979830093"/>
+        <p14:creationId xmlns:p14="http://schemas.microsoft.com/office/powerpoint/2010/main" val="658590563"/>
       </p:ext>
     </p:extLst>
   </p:cSld>

</xml_diff>

<commit_message>
improved Sites CS url
</commit_message>
<xml_diff>
--- a/soaring-through-the-clouds-ofmw-forum2016-valencia-demo.pptx
+++ b/soaring-through-the-clouds-ofmw-forum2016-valencia-demo.pptx
@@ -13454,8 +13454,8 @@
         </p:nvSpPr>
         <p:spPr>
           <a:xfrm>
-            <a:off x="5220072" y="12036"/>
-            <a:ext cx="3952429" cy="369332"/>
+            <a:off x="4572000" y="12036"/>
+            <a:ext cx="4611006" cy="369332"/>
           </a:xfrm>
           <a:prstGeom prst="rect">
             <a:avLst/>
@@ -13477,7 +13477,13 @@
               <a:rPr lang="en-GB" u="sng" dirty="0">
                 <a:hlinkClick r:id="rId6"/>
               </a:rPr>
-              <a:t>://tinyurl.com/ACED-KW</a:t>
+              <a:t>://</a:t>
+            </a:r>
+            <a:r>
+              <a:rPr lang="en-GB" u="sng" dirty="0" smtClean="0">
+                <a:hlinkClick r:id="rId6"/>
+              </a:rPr>
+              <a:t>tinyurl.com/ACEDCLOUD-KW</a:t>
             </a:r>
             <a:endParaRPr lang="de-DE" dirty="0"/>
           </a:p>

</xml_diff>